<commit_message>
Info on report - 2
</commit_message>
<xml_diff>
--- a/Pictures/Report.pptx
+++ b/Pictures/Report.pptx
@@ -3847,7 +3847,7 @@
         <p:spPr>
           <a:xfrm>
             <a:off x="42853" y="7126107"/>
-            <a:ext cx="6182526" cy="1846659"/>
+            <a:ext cx="4171142" cy="2031325"/>
           </a:xfrm>
           <a:prstGeom prst="rect">
             <a:avLst/>
@@ -3926,7 +3926,13 @@
             </a:r>
             <a:r>
               <a:rPr lang="en-US" sz="1200" dirty="0"/>
-              <a:t>. Deadline = Friday 24 Sept 23:59 </a:t>
+              <a:t>. </a:t>
+            </a:r>
+          </a:p>
+          <a:p>
+            <a:r>
+              <a:rPr lang="en-US" sz="1200" dirty="0"/>
+              <a:t>  - Deadline = Friday 24 Sept 2021 at 23:59 </a:t>
             </a:r>
           </a:p>
         </p:txBody>

</xml_diff>

<commit_message>
Update wet-lab report instructions
</commit_message>
<xml_diff>
--- a/Pictures/Report.pptx
+++ b/Pictures/Report.pptx
@@ -243,7 +243,7 @@
           <a:p>
             <a:fld id="{AE838A5E-F36F-4AC1-9778-6D8D7F5D5B8B}" type="datetimeFigureOut">
               <a:rPr lang="fr-FR" smtClean="0"/>
-              <a:t>15/07/2021</a:t>
+              <a:t>05/07/2022</a:t>
             </a:fld>
             <a:endParaRPr lang="fr-FR"/>
           </a:p>
@@ -285,7 +285,7 @@
           <a:p>
             <a:fld id="{8A2DA0C8-2C0F-40CF-8DDA-C2B273B090D3}" type="slidenum">
               <a:rPr lang="fr-FR" smtClean="0"/>
-              <a:t>‹N°›</a:t>
+              <a:t>‹#›</a:t>
             </a:fld>
             <a:endParaRPr lang="fr-FR"/>
           </a:p>
@@ -413,7 +413,7 @@
           <a:p>
             <a:fld id="{AE838A5E-F36F-4AC1-9778-6D8D7F5D5B8B}" type="datetimeFigureOut">
               <a:rPr lang="fr-FR" smtClean="0"/>
-              <a:t>15/07/2021</a:t>
+              <a:t>05/07/2022</a:t>
             </a:fld>
             <a:endParaRPr lang="fr-FR"/>
           </a:p>
@@ -455,7 +455,7 @@
           <a:p>
             <a:fld id="{8A2DA0C8-2C0F-40CF-8DDA-C2B273B090D3}" type="slidenum">
               <a:rPr lang="fr-FR" smtClean="0"/>
-              <a:t>‹N°›</a:t>
+              <a:t>‹#›</a:t>
             </a:fld>
             <a:endParaRPr lang="fr-FR"/>
           </a:p>
@@ -593,7 +593,7 @@
           <a:p>
             <a:fld id="{AE838A5E-F36F-4AC1-9778-6D8D7F5D5B8B}" type="datetimeFigureOut">
               <a:rPr lang="fr-FR" smtClean="0"/>
-              <a:t>15/07/2021</a:t>
+              <a:t>05/07/2022</a:t>
             </a:fld>
             <a:endParaRPr lang="fr-FR"/>
           </a:p>
@@ -635,7 +635,7 @@
           <a:p>
             <a:fld id="{8A2DA0C8-2C0F-40CF-8DDA-C2B273B090D3}" type="slidenum">
               <a:rPr lang="fr-FR" smtClean="0"/>
-              <a:t>‹N°›</a:t>
+              <a:t>‹#›</a:t>
             </a:fld>
             <a:endParaRPr lang="fr-FR"/>
           </a:p>
@@ -763,7 +763,7 @@
           <a:p>
             <a:fld id="{AE838A5E-F36F-4AC1-9778-6D8D7F5D5B8B}" type="datetimeFigureOut">
               <a:rPr lang="fr-FR" smtClean="0"/>
-              <a:t>15/07/2021</a:t>
+              <a:t>05/07/2022</a:t>
             </a:fld>
             <a:endParaRPr lang="fr-FR"/>
           </a:p>
@@ -805,7 +805,7 @@
           <a:p>
             <a:fld id="{8A2DA0C8-2C0F-40CF-8DDA-C2B273B090D3}" type="slidenum">
               <a:rPr lang="fr-FR" smtClean="0"/>
-              <a:t>‹N°›</a:t>
+              <a:t>‹#›</a:t>
             </a:fld>
             <a:endParaRPr lang="fr-FR"/>
           </a:p>
@@ -1007,7 +1007,7 @@
           <a:p>
             <a:fld id="{AE838A5E-F36F-4AC1-9778-6D8D7F5D5B8B}" type="datetimeFigureOut">
               <a:rPr lang="fr-FR" smtClean="0"/>
-              <a:t>15/07/2021</a:t>
+              <a:t>05/07/2022</a:t>
             </a:fld>
             <a:endParaRPr lang="fr-FR"/>
           </a:p>
@@ -1049,7 +1049,7 @@
           <a:p>
             <a:fld id="{8A2DA0C8-2C0F-40CF-8DDA-C2B273B090D3}" type="slidenum">
               <a:rPr lang="fr-FR" smtClean="0"/>
-              <a:t>‹N°›</a:t>
+              <a:t>‹#›</a:t>
             </a:fld>
             <a:endParaRPr lang="fr-FR"/>
           </a:p>
@@ -1239,7 +1239,7 @@
           <a:p>
             <a:fld id="{AE838A5E-F36F-4AC1-9778-6D8D7F5D5B8B}" type="datetimeFigureOut">
               <a:rPr lang="fr-FR" smtClean="0"/>
-              <a:t>15/07/2021</a:t>
+              <a:t>05/07/2022</a:t>
             </a:fld>
             <a:endParaRPr lang="fr-FR"/>
           </a:p>
@@ -1281,7 +1281,7 @@
           <a:p>
             <a:fld id="{8A2DA0C8-2C0F-40CF-8DDA-C2B273B090D3}" type="slidenum">
               <a:rPr lang="fr-FR" smtClean="0"/>
-              <a:t>‹N°›</a:t>
+              <a:t>‹#›</a:t>
             </a:fld>
             <a:endParaRPr lang="fr-FR"/>
           </a:p>
@@ -1606,7 +1606,7 @@
           <a:p>
             <a:fld id="{AE838A5E-F36F-4AC1-9778-6D8D7F5D5B8B}" type="datetimeFigureOut">
               <a:rPr lang="fr-FR" smtClean="0"/>
-              <a:t>15/07/2021</a:t>
+              <a:t>05/07/2022</a:t>
             </a:fld>
             <a:endParaRPr lang="fr-FR"/>
           </a:p>
@@ -1648,7 +1648,7 @@
           <a:p>
             <a:fld id="{8A2DA0C8-2C0F-40CF-8DDA-C2B273B090D3}" type="slidenum">
               <a:rPr lang="fr-FR" smtClean="0"/>
-              <a:t>‹N°›</a:t>
+              <a:t>‹#›</a:t>
             </a:fld>
             <a:endParaRPr lang="fr-FR"/>
           </a:p>
@@ -1724,7 +1724,7 @@
           <a:p>
             <a:fld id="{AE838A5E-F36F-4AC1-9778-6D8D7F5D5B8B}" type="datetimeFigureOut">
               <a:rPr lang="fr-FR" smtClean="0"/>
-              <a:t>15/07/2021</a:t>
+              <a:t>05/07/2022</a:t>
             </a:fld>
             <a:endParaRPr lang="fr-FR"/>
           </a:p>
@@ -1766,7 +1766,7 @@
           <a:p>
             <a:fld id="{8A2DA0C8-2C0F-40CF-8DDA-C2B273B090D3}" type="slidenum">
               <a:rPr lang="fr-FR" smtClean="0"/>
-              <a:t>‹N°›</a:t>
+              <a:t>‹#›</a:t>
             </a:fld>
             <a:endParaRPr lang="fr-FR"/>
           </a:p>
@@ -1819,7 +1819,7 @@
           <a:p>
             <a:fld id="{AE838A5E-F36F-4AC1-9778-6D8D7F5D5B8B}" type="datetimeFigureOut">
               <a:rPr lang="fr-FR" smtClean="0"/>
-              <a:t>15/07/2021</a:t>
+              <a:t>05/07/2022</a:t>
             </a:fld>
             <a:endParaRPr lang="fr-FR"/>
           </a:p>
@@ -1861,7 +1861,7 @@
           <a:p>
             <a:fld id="{8A2DA0C8-2C0F-40CF-8DDA-C2B273B090D3}" type="slidenum">
               <a:rPr lang="fr-FR" smtClean="0"/>
-              <a:t>‹N°›</a:t>
+              <a:t>‹#›</a:t>
             </a:fld>
             <a:endParaRPr lang="fr-FR"/>
           </a:p>
@@ -2096,7 +2096,7 @@
           <a:p>
             <a:fld id="{AE838A5E-F36F-4AC1-9778-6D8D7F5D5B8B}" type="datetimeFigureOut">
               <a:rPr lang="fr-FR" smtClean="0"/>
-              <a:t>15/07/2021</a:t>
+              <a:t>05/07/2022</a:t>
             </a:fld>
             <a:endParaRPr lang="fr-FR"/>
           </a:p>
@@ -2138,7 +2138,7 @@
           <a:p>
             <a:fld id="{8A2DA0C8-2C0F-40CF-8DDA-C2B273B090D3}" type="slidenum">
               <a:rPr lang="fr-FR" smtClean="0"/>
-              <a:t>‹N°›</a:t>
+              <a:t>‹#›</a:t>
             </a:fld>
             <a:endParaRPr lang="fr-FR"/>
           </a:p>
@@ -2353,7 +2353,7 @@
           <a:p>
             <a:fld id="{AE838A5E-F36F-4AC1-9778-6D8D7F5D5B8B}" type="datetimeFigureOut">
               <a:rPr lang="fr-FR" smtClean="0"/>
-              <a:t>15/07/2021</a:t>
+              <a:t>05/07/2022</a:t>
             </a:fld>
             <a:endParaRPr lang="fr-FR"/>
           </a:p>
@@ -2395,7 +2395,7 @@
           <a:p>
             <a:fld id="{8A2DA0C8-2C0F-40CF-8DDA-C2B273B090D3}" type="slidenum">
               <a:rPr lang="fr-FR" smtClean="0"/>
-              <a:t>‹N°›</a:t>
+              <a:t>‹#›</a:t>
             </a:fld>
             <a:endParaRPr lang="fr-FR"/>
           </a:p>
@@ -2566,7 +2566,7 @@
           <a:p>
             <a:fld id="{AE838A5E-F36F-4AC1-9778-6D8D7F5D5B8B}" type="datetimeFigureOut">
               <a:rPr lang="fr-FR" smtClean="0"/>
-              <a:t>15/07/2021</a:t>
+              <a:t>05/07/2022</a:t>
             </a:fld>
             <a:endParaRPr lang="fr-FR"/>
           </a:p>
@@ -2644,7 +2644,7 @@
           <a:p>
             <a:fld id="{8A2DA0C8-2C0F-40CF-8DDA-C2B273B090D3}" type="slidenum">
               <a:rPr lang="fr-FR" smtClean="0"/>
-              <a:t>‹N°›</a:t>
+              <a:t>‹#›</a:t>
             </a:fld>
             <a:endParaRPr lang="fr-FR"/>
           </a:p>
@@ -3844,7 +3844,7 @@
         <p:spPr>
           <a:xfrm>
             <a:off x="42853" y="1011173"/>
-            <a:ext cx="4141518" cy="369332"/>
+            <a:ext cx="5146858" cy="369332"/>
           </a:xfrm>
           <a:prstGeom prst="rect">
             <a:avLst/>
@@ -3859,7 +3859,7 @@
           <a:p>
             <a:r>
               <a:rPr lang="en-US" b="1" dirty="0"/>
-              <a:t>Outline of the report of the ChIP practical</a:t>
+              <a:t>Outline of the report of the ChIP practical (WET-LAB)</a:t>
             </a:r>
           </a:p>
         </p:txBody>
@@ -3878,8 +3878,8 @@
         </p:nvSpPr>
         <p:spPr>
           <a:xfrm>
-            <a:off x="42853" y="7126107"/>
-            <a:ext cx="4171142" cy="2031325"/>
+            <a:off x="42853" y="8845101"/>
+            <a:ext cx="4171142" cy="1661993"/>
           </a:xfrm>
           <a:prstGeom prst="rect">
             <a:avLst/>
@@ -3944,12 +3944,6 @@
           <a:p>
             <a:r>
               <a:rPr lang="en-US" sz="1200" dirty="0"/>
-              <a:t>  - Written as a scientific publication</a:t>
-            </a:r>
-          </a:p>
-          <a:p>
-            <a:r>
-              <a:rPr lang="en-US" sz="1200" dirty="0"/>
               <a:t>  - Electronic version (not printed). PDF. Deposited on </a:t>
             </a:r>
             <a:r>
@@ -3958,13 +3952,7 @@
             </a:r>
             <a:r>
               <a:rPr lang="en-US" sz="1200" dirty="0"/>
-              <a:t>. </a:t>
-            </a:r>
-          </a:p>
-          <a:p>
-            <a:r>
-              <a:rPr lang="en-US" sz="1200" dirty="0"/>
-              <a:t>  - Deadline = Friday 24 Sept 2021 at 23:59 </a:t>
+              <a:t>.</a:t>
             </a:r>
           </a:p>
         </p:txBody>
@@ -4002,6 +3990,316 @@
               <a:t>Names</a:t>
             </a:r>
             <a:endParaRPr lang="en-US" sz="1200" dirty="0"/>
+          </a:p>
+        </p:txBody>
+      </p:sp>
+      <p:sp>
+        <p:nvSpPr>
+          <p:cNvPr id="23" name="TextBox 22">
+            <a:extLst>
+              <a:ext uri="{FF2B5EF4-FFF2-40B4-BE49-F238E27FC236}">
+                <a16:creationId xmlns:a16="http://schemas.microsoft.com/office/drawing/2014/main" id="{57EB1550-A75E-08F0-AFD3-47B2E4484453}"/>
+              </a:ext>
+            </a:extLst>
+          </p:cNvPr>
+          <p:cNvSpPr txBox="1"/>
+          <p:nvPr/>
+        </p:nvSpPr>
+        <p:spPr>
+          <a:xfrm>
+            <a:off x="0" y="7278687"/>
+            <a:ext cx="5918886" cy="1292662"/>
+          </a:xfrm>
+          <a:prstGeom prst="rect">
+            <a:avLst/>
+          </a:prstGeom>
+          <a:noFill/>
+        </p:spPr>
+        <p:txBody>
+          <a:bodyPr wrap="square" rtlCol="0">
+            <a:spAutoFit/>
+          </a:bodyPr>
+          <a:lstStyle/>
+          <a:p>
+            <a:r>
+              <a:rPr lang="en-US" b="1" dirty="0"/>
+              <a:t>Writing instructions</a:t>
+            </a:r>
+          </a:p>
+          <a:p>
+            <a:r>
+              <a:rPr lang="en-US" sz="1200" dirty="0"/>
+              <a:t>  - Write with your own words. </a:t>
+            </a:r>
+          </a:p>
+          <a:p>
+            <a:r>
+              <a:rPr lang="en-US" sz="1200" dirty="0"/>
+              <a:t>  - Copy-paste (from websites, existing publications, …) is prohibited (plagiarism). </a:t>
+            </a:r>
+          </a:p>
+          <a:p>
+            <a:r>
+              <a:rPr lang="en-US" sz="1200" dirty="0"/>
+              <a:t>  - Cite your sources when needed</a:t>
+            </a:r>
+          </a:p>
+          <a:p>
+            <a:r>
+              <a:rPr lang="en-US" sz="1200" dirty="0"/>
+              <a:t>  - Avoid sprawling sentences. Instead, adopt concise / efficient / precise / scientific writing (as done in publications).</a:t>
+            </a:r>
+          </a:p>
+        </p:txBody>
+      </p:sp>
+      <p:sp>
+        <p:nvSpPr>
+          <p:cNvPr id="24" name="TextBox 23">
+            <a:extLst>
+              <a:ext uri="{FF2B5EF4-FFF2-40B4-BE49-F238E27FC236}">
+                <a16:creationId xmlns:a16="http://schemas.microsoft.com/office/drawing/2014/main" id="{D37F488E-1FB1-5446-23D1-496F349B5C69}"/>
+              </a:ext>
+            </a:extLst>
+          </p:cNvPr>
+          <p:cNvSpPr txBox="1"/>
+          <p:nvPr/>
+        </p:nvSpPr>
+        <p:spPr>
+          <a:xfrm>
+            <a:off x="31228" y="10724779"/>
+            <a:ext cx="4220899" cy="553998"/>
+          </a:xfrm>
+          <a:prstGeom prst="rect">
+            <a:avLst/>
+          </a:prstGeom>
+          <a:noFill/>
+        </p:spPr>
+        <p:txBody>
+          <a:bodyPr wrap="none" rtlCol="0">
+            <a:spAutoFit/>
+          </a:bodyPr>
+          <a:lstStyle/>
+          <a:p>
+            <a:r>
+              <a:rPr lang="en-US" b="1" dirty="0"/>
+              <a:t>Grade</a:t>
+            </a:r>
+          </a:p>
+          <a:p>
+            <a:r>
+              <a:rPr lang="en-US" sz="1200" dirty="0"/>
+              <a:t>  This report accounts for 60% of your grade for the teaching unit</a:t>
+            </a:r>
+          </a:p>
+        </p:txBody>
+      </p:sp>
+      <p:sp>
+        <p:nvSpPr>
+          <p:cNvPr id="2" name="TextBox 1">
+            <a:extLst>
+              <a:ext uri="{FF2B5EF4-FFF2-40B4-BE49-F238E27FC236}">
+                <a16:creationId xmlns:a16="http://schemas.microsoft.com/office/drawing/2014/main" id="{6C204AB0-CE60-D706-E12B-445FC1AFC9E6}"/>
+              </a:ext>
+            </a:extLst>
+          </p:cNvPr>
+          <p:cNvSpPr txBox="1"/>
+          <p:nvPr/>
+        </p:nvSpPr>
+        <p:spPr>
+          <a:xfrm>
+            <a:off x="2100601" y="3822527"/>
+            <a:ext cx="256802" cy="261610"/>
+          </a:xfrm>
+          <a:prstGeom prst="rect">
+            <a:avLst/>
+          </a:prstGeom>
+          <a:noFill/>
+        </p:spPr>
+        <p:txBody>
+          <a:bodyPr wrap="none" rtlCol="0">
+            <a:spAutoFit/>
+          </a:bodyPr>
+          <a:lstStyle/>
+          <a:p>
+            <a:r>
+              <a:rPr lang="en-FR" sz="1100" dirty="0"/>
+              <a:t>1</a:t>
+            </a:r>
+          </a:p>
+        </p:txBody>
+      </p:sp>
+      <p:sp>
+        <p:nvSpPr>
+          <p:cNvPr id="26" name="TextBox 25">
+            <a:extLst>
+              <a:ext uri="{FF2B5EF4-FFF2-40B4-BE49-F238E27FC236}">
+                <a16:creationId xmlns:a16="http://schemas.microsoft.com/office/drawing/2014/main" id="{A1F27896-F64E-3609-72A0-FF6313BC5383}"/>
+              </a:ext>
+            </a:extLst>
+          </p:cNvPr>
+          <p:cNvSpPr txBox="1"/>
+          <p:nvPr/>
+        </p:nvSpPr>
+        <p:spPr>
+          <a:xfrm>
+            <a:off x="4243797" y="3842704"/>
+            <a:ext cx="256802" cy="261610"/>
+          </a:xfrm>
+          <a:prstGeom prst="rect">
+            <a:avLst/>
+          </a:prstGeom>
+          <a:noFill/>
+        </p:spPr>
+        <p:txBody>
+          <a:bodyPr wrap="none" rtlCol="0">
+            <a:spAutoFit/>
+          </a:bodyPr>
+          <a:lstStyle/>
+          <a:p>
+            <a:r>
+              <a:rPr lang="en-FR" sz="1100" dirty="0"/>
+              <a:t>2</a:t>
+            </a:r>
+          </a:p>
+        </p:txBody>
+      </p:sp>
+      <p:sp>
+        <p:nvSpPr>
+          <p:cNvPr id="27" name="TextBox 26">
+            <a:extLst>
+              <a:ext uri="{FF2B5EF4-FFF2-40B4-BE49-F238E27FC236}">
+                <a16:creationId xmlns:a16="http://schemas.microsoft.com/office/drawing/2014/main" id="{7B07AF08-4F04-9F02-F3DE-7972172D86EC}"/>
+              </a:ext>
+            </a:extLst>
+          </p:cNvPr>
+          <p:cNvSpPr txBox="1"/>
+          <p:nvPr/>
+        </p:nvSpPr>
+        <p:spPr>
+          <a:xfrm>
+            <a:off x="6348510" y="3840846"/>
+            <a:ext cx="256802" cy="261610"/>
+          </a:xfrm>
+          <a:prstGeom prst="rect">
+            <a:avLst/>
+          </a:prstGeom>
+          <a:noFill/>
+        </p:spPr>
+        <p:txBody>
+          <a:bodyPr wrap="none" rtlCol="0">
+            <a:spAutoFit/>
+          </a:bodyPr>
+          <a:lstStyle/>
+          <a:p>
+            <a:r>
+              <a:rPr lang="en-FR" sz="1100" dirty="0"/>
+              <a:t>3</a:t>
+            </a:r>
+          </a:p>
+        </p:txBody>
+      </p:sp>
+      <p:sp>
+        <p:nvSpPr>
+          <p:cNvPr id="28" name="TextBox 27">
+            <a:extLst>
+              <a:ext uri="{FF2B5EF4-FFF2-40B4-BE49-F238E27FC236}">
+                <a16:creationId xmlns:a16="http://schemas.microsoft.com/office/drawing/2014/main" id="{0B9D01AD-F944-53E1-A424-F9FA9D79CFAC}"/>
+              </a:ext>
+            </a:extLst>
+          </p:cNvPr>
+          <p:cNvSpPr txBox="1"/>
+          <p:nvPr/>
+        </p:nvSpPr>
+        <p:spPr>
+          <a:xfrm>
+            <a:off x="2150588" y="6737930"/>
+            <a:ext cx="256802" cy="261610"/>
+          </a:xfrm>
+          <a:prstGeom prst="rect">
+            <a:avLst/>
+          </a:prstGeom>
+          <a:noFill/>
+        </p:spPr>
+        <p:txBody>
+          <a:bodyPr wrap="none" rtlCol="0">
+            <a:spAutoFit/>
+          </a:bodyPr>
+          <a:lstStyle/>
+          <a:p>
+            <a:r>
+              <a:rPr lang="en-FR" sz="1100" dirty="0"/>
+              <a:t>4</a:t>
+            </a:r>
+          </a:p>
+        </p:txBody>
+      </p:sp>
+      <p:sp>
+        <p:nvSpPr>
+          <p:cNvPr id="29" name="TextBox 28">
+            <a:extLst>
+              <a:ext uri="{FF2B5EF4-FFF2-40B4-BE49-F238E27FC236}">
+                <a16:creationId xmlns:a16="http://schemas.microsoft.com/office/drawing/2014/main" id="{3CF7E77B-0A35-E165-8CC0-170822C98B45}"/>
+              </a:ext>
+            </a:extLst>
+          </p:cNvPr>
+          <p:cNvSpPr txBox="1"/>
+          <p:nvPr/>
+        </p:nvSpPr>
+        <p:spPr>
+          <a:xfrm>
+            <a:off x="4256716" y="6733395"/>
+            <a:ext cx="256802" cy="261610"/>
+          </a:xfrm>
+          <a:prstGeom prst="rect">
+            <a:avLst/>
+          </a:prstGeom>
+          <a:noFill/>
+        </p:spPr>
+        <p:txBody>
+          <a:bodyPr wrap="none" rtlCol="0">
+            <a:spAutoFit/>
+          </a:bodyPr>
+          <a:lstStyle/>
+          <a:p>
+            <a:r>
+              <a:rPr lang="en-FR" sz="1100" dirty="0"/>
+              <a:t>5</a:t>
+            </a:r>
+          </a:p>
+        </p:txBody>
+      </p:sp>
+      <p:sp>
+        <p:nvSpPr>
+          <p:cNvPr id="30" name="TextBox 29">
+            <a:extLst>
+              <a:ext uri="{FF2B5EF4-FFF2-40B4-BE49-F238E27FC236}">
+                <a16:creationId xmlns:a16="http://schemas.microsoft.com/office/drawing/2014/main" id="{B2A1D7C7-B3A4-4EC9-6420-55A245FF183D}"/>
+              </a:ext>
+            </a:extLst>
+          </p:cNvPr>
+          <p:cNvSpPr txBox="1"/>
+          <p:nvPr/>
+        </p:nvSpPr>
+        <p:spPr>
+          <a:xfrm>
+            <a:off x="6361429" y="6731537"/>
+            <a:ext cx="256802" cy="261610"/>
+          </a:xfrm>
+          <a:prstGeom prst="rect">
+            <a:avLst/>
+          </a:prstGeom>
+          <a:noFill/>
+        </p:spPr>
+        <p:txBody>
+          <a:bodyPr wrap="none" rtlCol="0">
+            <a:spAutoFit/>
+          </a:bodyPr>
+          <a:lstStyle/>
+          <a:p>
+            <a:r>
+              <a:rPr lang="en-FR" sz="1100" dirty="0"/>
+              <a:t>6</a:t>
+            </a:r>
           </a:p>
         </p:txBody>
       </p:sp>

</xml_diff>

<commit_message>
proofreading of a few typos
</commit_message>
<xml_diff>
--- a/Pictures/Report.pptx
+++ b/Pictures/Report.pptx
@@ -2,12 +2,12 @@
 <file path=ppt/presentation.xml><?xml version="1.0" encoding="utf-8"?>
 <p:presentation xmlns:a="http://schemas.openxmlformats.org/drawingml/2006/main" xmlns:r="http://schemas.openxmlformats.org/officeDocument/2006/relationships" xmlns:p="http://schemas.openxmlformats.org/presentationml/2006/main" saveSubsetFonts="1">
   <p:sldMasterIdLst>
-    <p:sldMasterId id="2147483684" r:id="rId1"/>
+    <p:sldMasterId id="2147483660" r:id="rId1"/>
   </p:sldMasterIdLst>
   <p:sldIdLst>
     <p:sldId id="256" r:id="rId2"/>
   </p:sldIdLst>
-  <p:sldSz cx="6858000" cy="7199313"/>
+  <p:sldSz cx="6858000" cy="12192000"/>
   <p:notesSz cx="6858000" cy="9144000"/>
   <p:defaultTextStyle>
     <a:defPPr>
@@ -114,7 +114,7 @@
 
 <file path=ppt/slideLayouts/slideLayout1.xml><?xml version="1.0" encoding="utf-8"?>
 <p:sldLayout xmlns:a="http://schemas.openxmlformats.org/drawingml/2006/main" xmlns:r="http://schemas.openxmlformats.org/officeDocument/2006/relationships" xmlns:p="http://schemas.openxmlformats.org/presentationml/2006/main" type="title" preserve="1">
-  <p:cSld name="Diapositive de titre">
+  <p:cSld name="Title Slide">
     <p:spTree>
       <p:nvGrpSpPr>
         <p:cNvPr id="1" name=""/>
@@ -141,8 +141,8 @@
         </p:nvSpPr>
         <p:spPr>
           <a:xfrm>
-            <a:off x="514350" y="1178222"/>
-            <a:ext cx="5829300" cy="2506427"/>
+            <a:off x="514350" y="1995312"/>
+            <a:ext cx="5829300" cy="4244622"/>
           </a:xfrm>
         </p:spPr>
         <p:txBody>
@@ -154,8 +154,8 @@
           </a:lstStyle>
           <a:p>
             <a:r>
-              <a:rPr lang="fr-FR"/>
-              <a:t>Modifiez le style du titre</a:t>
+              <a:rPr lang="en-US"/>
+              <a:t>Click to edit Master title style</a:t>
             </a:r>
             <a:endParaRPr lang="en-US" dirty="0"/>
           </a:p>
@@ -173,8 +173,8 @@
         </p:nvSpPr>
         <p:spPr>
           <a:xfrm>
-            <a:off x="857250" y="3781306"/>
-            <a:ext cx="5143500" cy="1738167"/>
+            <a:off x="857250" y="6403623"/>
+            <a:ext cx="5143500" cy="2943577"/>
           </a:xfrm>
         </p:spPr>
         <p:txBody>
@@ -219,8 +219,8 @@
           </a:lstStyle>
           <a:p>
             <a:r>
-              <a:rPr lang="fr-FR"/>
-              <a:t>Modifiez le style des sous-titres du masque</a:t>
+              <a:rPr lang="en-US"/>
+              <a:t>Click to edit Master subtitle style</a:t>
             </a:r>
             <a:endParaRPr lang="en-US" dirty="0"/>
           </a:p>
@@ -243,7 +243,7 @@
           <a:p>
             <a:fld id="{AE838A5E-F36F-4AC1-9778-6D8D7F5D5B8B}" type="datetimeFigureOut">
               <a:rPr lang="fr-FR" smtClean="0"/>
-              <a:t>20/07/2022</a:t>
+              <a:t>26/08/2022</a:t>
             </a:fld>
             <a:endParaRPr lang="fr-FR"/>
           </a:p>
@@ -285,7 +285,7 @@
           <a:p>
             <a:fld id="{8A2DA0C8-2C0F-40CF-8DDA-C2B273B090D3}" type="slidenum">
               <a:rPr lang="fr-FR" smtClean="0"/>
-              <a:t>‹N°›</a:t>
+              <a:t>‹#›</a:t>
             </a:fld>
             <a:endParaRPr lang="fr-FR"/>
           </a:p>
@@ -294,7 +294,7 @@
     </p:spTree>
     <p:extLst>
       <p:ext uri="{BB962C8B-B14F-4D97-AF65-F5344CB8AC3E}">
-        <p14:creationId xmlns:p14="http://schemas.microsoft.com/office/powerpoint/2010/main" val="3471145096"/>
+        <p14:creationId xmlns:p14="http://schemas.microsoft.com/office/powerpoint/2010/main" val="1439970947"/>
       </p:ext>
     </p:extLst>
   </p:cSld>
@@ -306,7 +306,7 @@
 
 <file path=ppt/slideLayouts/slideLayout10.xml><?xml version="1.0" encoding="utf-8"?>
 <p:sldLayout xmlns:a="http://schemas.openxmlformats.org/drawingml/2006/main" xmlns:r="http://schemas.openxmlformats.org/officeDocument/2006/relationships" xmlns:p="http://schemas.openxmlformats.org/presentationml/2006/main" type="vertTx" preserve="1">
-  <p:cSld name="Titre et texte vertical">
+  <p:cSld name="Title and Vertical Text">
     <p:spTree>
       <p:nvGrpSpPr>
         <p:cNvPr id="1" name=""/>
@@ -337,8 +337,8 @@
           <a:lstStyle/>
           <a:p>
             <a:r>
-              <a:rPr lang="fr-FR"/>
-              <a:t>Modifiez le style du titre</a:t>
+              <a:rPr lang="en-US"/>
+              <a:t>Click to edit Master title style</a:t>
             </a:r>
             <a:endParaRPr lang="en-US" dirty="0"/>
           </a:p>
@@ -361,36 +361,36 @@
           <a:p>
             <a:pPr lvl="0"/>
             <a:r>
-              <a:rPr lang="fr-FR"/>
-              <a:t>Cliquez pour modifier les styles du texte du masque</a:t>
+              <a:rPr lang="en-US"/>
+              <a:t>Click to edit Master text styles</a:t>
             </a:r>
           </a:p>
           <a:p>
             <a:pPr lvl="1"/>
             <a:r>
-              <a:rPr lang="fr-FR"/>
-              <a:t>Deuxième niveau</a:t>
+              <a:rPr lang="en-US"/>
+              <a:t>Second level</a:t>
             </a:r>
           </a:p>
           <a:p>
             <a:pPr lvl="2"/>
             <a:r>
-              <a:rPr lang="fr-FR"/>
-              <a:t>Troisième niveau</a:t>
+              <a:rPr lang="en-US"/>
+              <a:t>Third level</a:t>
             </a:r>
           </a:p>
           <a:p>
             <a:pPr lvl="3"/>
             <a:r>
-              <a:rPr lang="fr-FR"/>
-              <a:t>Quatrième niveau</a:t>
+              <a:rPr lang="en-US"/>
+              <a:t>Fourth level</a:t>
             </a:r>
           </a:p>
           <a:p>
             <a:pPr lvl="4"/>
             <a:r>
-              <a:rPr lang="fr-FR"/>
-              <a:t>Cinquième niveau</a:t>
+              <a:rPr lang="en-US"/>
+              <a:t>Fifth level</a:t>
             </a:r>
             <a:endParaRPr lang="en-US" dirty="0"/>
           </a:p>
@@ -413,7 +413,7 @@
           <a:p>
             <a:fld id="{AE838A5E-F36F-4AC1-9778-6D8D7F5D5B8B}" type="datetimeFigureOut">
               <a:rPr lang="fr-FR" smtClean="0"/>
-              <a:t>20/07/2022</a:t>
+              <a:t>26/08/2022</a:t>
             </a:fld>
             <a:endParaRPr lang="fr-FR"/>
           </a:p>
@@ -455,7 +455,7 @@
           <a:p>
             <a:fld id="{8A2DA0C8-2C0F-40CF-8DDA-C2B273B090D3}" type="slidenum">
               <a:rPr lang="fr-FR" smtClean="0"/>
-              <a:t>‹N°›</a:t>
+              <a:t>‹#›</a:t>
             </a:fld>
             <a:endParaRPr lang="fr-FR"/>
           </a:p>
@@ -464,7 +464,7 @@
     </p:spTree>
     <p:extLst>
       <p:ext uri="{BB962C8B-B14F-4D97-AF65-F5344CB8AC3E}">
-        <p14:creationId xmlns:p14="http://schemas.microsoft.com/office/powerpoint/2010/main" val="1991605731"/>
+        <p14:creationId xmlns:p14="http://schemas.microsoft.com/office/powerpoint/2010/main" val="1429445378"/>
       </p:ext>
     </p:extLst>
   </p:cSld>
@@ -476,7 +476,7 @@
 
 <file path=ppt/slideLayouts/slideLayout11.xml><?xml version="1.0" encoding="utf-8"?>
 <p:sldLayout xmlns:a="http://schemas.openxmlformats.org/drawingml/2006/main" xmlns:r="http://schemas.openxmlformats.org/officeDocument/2006/relationships" xmlns:p="http://schemas.openxmlformats.org/presentationml/2006/main" type="vertTitleAndTx" preserve="1">
-  <p:cSld name="Titre vertical et texte">
+  <p:cSld name="Vertical Title and Text">
     <p:spTree>
       <p:nvGrpSpPr>
         <p:cNvPr id="1" name=""/>
@@ -503,8 +503,8 @@
         </p:nvSpPr>
         <p:spPr>
           <a:xfrm>
-            <a:off x="4907757" y="383297"/>
-            <a:ext cx="1478756" cy="6101085"/>
+            <a:off x="4907757" y="649111"/>
+            <a:ext cx="1478756" cy="10332156"/>
           </a:xfrm>
         </p:spPr>
         <p:txBody>
@@ -512,8 +512,8 @@
           <a:lstStyle/>
           <a:p>
             <a:r>
-              <a:rPr lang="fr-FR"/>
-              <a:t>Modifiez le style du titre</a:t>
+              <a:rPr lang="en-US"/>
+              <a:t>Click to edit Master title style</a:t>
             </a:r>
             <a:endParaRPr lang="en-US" dirty="0"/>
           </a:p>
@@ -531,8 +531,8 @@
         </p:nvSpPr>
         <p:spPr>
           <a:xfrm>
-            <a:off x="471488" y="383297"/>
-            <a:ext cx="4350544" cy="6101085"/>
+            <a:off x="471488" y="649111"/>
+            <a:ext cx="4350544" cy="10332156"/>
           </a:xfrm>
         </p:spPr>
         <p:txBody>
@@ -541,36 +541,36 @@
           <a:p>
             <a:pPr lvl="0"/>
             <a:r>
-              <a:rPr lang="fr-FR"/>
-              <a:t>Cliquez pour modifier les styles du texte du masque</a:t>
+              <a:rPr lang="en-US"/>
+              <a:t>Click to edit Master text styles</a:t>
             </a:r>
           </a:p>
           <a:p>
             <a:pPr lvl="1"/>
             <a:r>
-              <a:rPr lang="fr-FR"/>
-              <a:t>Deuxième niveau</a:t>
+              <a:rPr lang="en-US"/>
+              <a:t>Second level</a:t>
             </a:r>
           </a:p>
           <a:p>
             <a:pPr lvl="2"/>
             <a:r>
-              <a:rPr lang="fr-FR"/>
-              <a:t>Troisième niveau</a:t>
+              <a:rPr lang="en-US"/>
+              <a:t>Third level</a:t>
             </a:r>
           </a:p>
           <a:p>
             <a:pPr lvl="3"/>
             <a:r>
-              <a:rPr lang="fr-FR"/>
-              <a:t>Quatrième niveau</a:t>
+              <a:rPr lang="en-US"/>
+              <a:t>Fourth level</a:t>
             </a:r>
           </a:p>
           <a:p>
             <a:pPr lvl="4"/>
             <a:r>
-              <a:rPr lang="fr-FR"/>
-              <a:t>Cinquième niveau</a:t>
+              <a:rPr lang="en-US"/>
+              <a:t>Fifth level</a:t>
             </a:r>
             <a:endParaRPr lang="en-US" dirty="0"/>
           </a:p>
@@ -593,7 +593,7 @@
           <a:p>
             <a:fld id="{AE838A5E-F36F-4AC1-9778-6D8D7F5D5B8B}" type="datetimeFigureOut">
               <a:rPr lang="fr-FR" smtClean="0"/>
-              <a:t>20/07/2022</a:t>
+              <a:t>26/08/2022</a:t>
             </a:fld>
             <a:endParaRPr lang="fr-FR"/>
           </a:p>
@@ -635,7 +635,7 @@
           <a:p>
             <a:fld id="{8A2DA0C8-2C0F-40CF-8DDA-C2B273B090D3}" type="slidenum">
               <a:rPr lang="fr-FR" smtClean="0"/>
-              <a:t>‹N°›</a:t>
+              <a:t>‹#›</a:t>
             </a:fld>
             <a:endParaRPr lang="fr-FR"/>
           </a:p>
@@ -644,7 +644,7 @@
     </p:spTree>
     <p:extLst>
       <p:ext uri="{BB962C8B-B14F-4D97-AF65-F5344CB8AC3E}">
-        <p14:creationId xmlns:p14="http://schemas.microsoft.com/office/powerpoint/2010/main" val="2049149005"/>
+        <p14:creationId xmlns:p14="http://schemas.microsoft.com/office/powerpoint/2010/main" val="56515554"/>
       </p:ext>
     </p:extLst>
   </p:cSld>
@@ -656,7 +656,7 @@
 
 <file path=ppt/slideLayouts/slideLayout2.xml><?xml version="1.0" encoding="utf-8"?>
 <p:sldLayout xmlns:a="http://schemas.openxmlformats.org/drawingml/2006/main" xmlns:r="http://schemas.openxmlformats.org/officeDocument/2006/relationships" xmlns:p="http://schemas.openxmlformats.org/presentationml/2006/main" type="obj" preserve="1">
-  <p:cSld name="Titre et contenu">
+  <p:cSld name="Title and Content">
     <p:spTree>
       <p:nvGrpSpPr>
         <p:cNvPr id="1" name=""/>
@@ -687,8 +687,8 @@
           <a:lstStyle/>
           <a:p>
             <a:r>
-              <a:rPr lang="fr-FR"/>
-              <a:t>Modifiez le style du titre</a:t>
+              <a:rPr lang="en-US"/>
+              <a:t>Click to edit Master title style</a:t>
             </a:r>
             <a:endParaRPr lang="en-US" dirty="0"/>
           </a:p>
@@ -711,36 +711,36 @@
           <a:p>
             <a:pPr lvl="0"/>
             <a:r>
-              <a:rPr lang="fr-FR"/>
-              <a:t>Cliquez pour modifier les styles du texte du masque</a:t>
+              <a:rPr lang="en-US"/>
+              <a:t>Click to edit Master text styles</a:t>
             </a:r>
           </a:p>
           <a:p>
             <a:pPr lvl="1"/>
             <a:r>
-              <a:rPr lang="fr-FR"/>
-              <a:t>Deuxième niveau</a:t>
+              <a:rPr lang="en-US"/>
+              <a:t>Second level</a:t>
             </a:r>
           </a:p>
           <a:p>
             <a:pPr lvl="2"/>
             <a:r>
-              <a:rPr lang="fr-FR"/>
-              <a:t>Troisième niveau</a:t>
+              <a:rPr lang="en-US"/>
+              <a:t>Third level</a:t>
             </a:r>
           </a:p>
           <a:p>
             <a:pPr lvl="3"/>
             <a:r>
-              <a:rPr lang="fr-FR"/>
-              <a:t>Quatrième niveau</a:t>
+              <a:rPr lang="en-US"/>
+              <a:t>Fourth level</a:t>
             </a:r>
           </a:p>
           <a:p>
             <a:pPr lvl="4"/>
             <a:r>
-              <a:rPr lang="fr-FR"/>
-              <a:t>Cinquième niveau</a:t>
+              <a:rPr lang="en-US"/>
+              <a:t>Fifth level</a:t>
             </a:r>
             <a:endParaRPr lang="en-US" dirty="0"/>
           </a:p>
@@ -763,7 +763,7 @@
           <a:p>
             <a:fld id="{AE838A5E-F36F-4AC1-9778-6D8D7F5D5B8B}" type="datetimeFigureOut">
               <a:rPr lang="fr-FR" smtClean="0"/>
-              <a:t>20/07/2022</a:t>
+              <a:t>26/08/2022</a:t>
             </a:fld>
             <a:endParaRPr lang="fr-FR"/>
           </a:p>
@@ -805,7 +805,7 @@
           <a:p>
             <a:fld id="{8A2DA0C8-2C0F-40CF-8DDA-C2B273B090D3}" type="slidenum">
               <a:rPr lang="fr-FR" smtClean="0"/>
-              <a:t>‹N°›</a:t>
+              <a:t>‹#›</a:t>
             </a:fld>
             <a:endParaRPr lang="fr-FR"/>
           </a:p>
@@ -814,7 +814,7 @@
     </p:spTree>
     <p:extLst>
       <p:ext uri="{BB962C8B-B14F-4D97-AF65-F5344CB8AC3E}">
-        <p14:creationId xmlns:p14="http://schemas.microsoft.com/office/powerpoint/2010/main" val="476868905"/>
+        <p14:creationId xmlns:p14="http://schemas.microsoft.com/office/powerpoint/2010/main" val="3291542531"/>
       </p:ext>
     </p:extLst>
   </p:cSld>
@@ -826,7 +826,7 @@
 
 <file path=ppt/slideLayouts/slideLayout3.xml><?xml version="1.0" encoding="utf-8"?>
 <p:sldLayout xmlns:a="http://schemas.openxmlformats.org/drawingml/2006/main" xmlns:r="http://schemas.openxmlformats.org/officeDocument/2006/relationships" xmlns:p="http://schemas.openxmlformats.org/presentationml/2006/main" type="secHead" preserve="1">
-  <p:cSld name="Titre de section">
+  <p:cSld name="Section Header">
     <p:spTree>
       <p:nvGrpSpPr>
         <p:cNvPr id="1" name=""/>
@@ -853,8 +853,8 @@
         </p:nvSpPr>
         <p:spPr>
           <a:xfrm>
-            <a:off x="467916" y="1794831"/>
-            <a:ext cx="5915025" cy="2994714"/>
+            <a:off x="467916" y="3039537"/>
+            <a:ext cx="5915025" cy="5071532"/>
           </a:xfrm>
         </p:spPr>
         <p:txBody>
@@ -866,8 +866,8 @@
           </a:lstStyle>
           <a:p>
             <a:r>
-              <a:rPr lang="fr-FR"/>
-              <a:t>Modifiez le style du titre</a:t>
+              <a:rPr lang="en-US"/>
+              <a:t>Click to edit Master title style</a:t>
             </a:r>
             <a:endParaRPr lang="en-US" dirty="0"/>
           </a:p>
@@ -885,8 +885,8 @@
         </p:nvSpPr>
         <p:spPr>
           <a:xfrm>
-            <a:off x="467916" y="4817876"/>
-            <a:ext cx="5915025" cy="1574849"/>
+            <a:off x="467916" y="8159048"/>
+            <a:ext cx="5915025" cy="2666999"/>
           </a:xfrm>
         </p:spPr>
         <p:txBody>
@@ -984,8 +984,8 @@
           <a:p>
             <a:pPr lvl="0"/>
             <a:r>
-              <a:rPr lang="fr-FR"/>
-              <a:t>Cliquez pour modifier les styles du texte du masque</a:t>
+              <a:rPr lang="en-US"/>
+              <a:t>Click to edit Master text styles</a:t>
             </a:r>
           </a:p>
         </p:txBody>
@@ -1007,7 +1007,7 @@
           <a:p>
             <a:fld id="{AE838A5E-F36F-4AC1-9778-6D8D7F5D5B8B}" type="datetimeFigureOut">
               <a:rPr lang="fr-FR" smtClean="0"/>
-              <a:t>20/07/2022</a:t>
+              <a:t>26/08/2022</a:t>
             </a:fld>
             <a:endParaRPr lang="fr-FR"/>
           </a:p>
@@ -1049,7 +1049,7 @@
           <a:p>
             <a:fld id="{8A2DA0C8-2C0F-40CF-8DDA-C2B273B090D3}" type="slidenum">
               <a:rPr lang="fr-FR" smtClean="0"/>
-              <a:t>‹N°›</a:t>
+              <a:t>‹#›</a:t>
             </a:fld>
             <a:endParaRPr lang="fr-FR"/>
           </a:p>
@@ -1058,7 +1058,7 @@
     </p:spTree>
     <p:extLst>
       <p:ext uri="{BB962C8B-B14F-4D97-AF65-F5344CB8AC3E}">
-        <p14:creationId xmlns:p14="http://schemas.microsoft.com/office/powerpoint/2010/main" val="1986506728"/>
+        <p14:creationId xmlns:p14="http://schemas.microsoft.com/office/powerpoint/2010/main" val="184943497"/>
       </p:ext>
     </p:extLst>
   </p:cSld>
@@ -1070,7 +1070,7 @@
 
 <file path=ppt/slideLayouts/slideLayout4.xml><?xml version="1.0" encoding="utf-8"?>
 <p:sldLayout xmlns:a="http://schemas.openxmlformats.org/drawingml/2006/main" xmlns:r="http://schemas.openxmlformats.org/officeDocument/2006/relationships" xmlns:p="http://schemas.openxmlformats.org/presentationml/2006/main" type="twoObj" preserve="1">
-  <p:cSld name="Deux contenus">
+  <p:cSld name="Two Content">
     <p:spTree>
       <p:nvGrpSpPr>
         <p:cNvPr id="1" name=""/>
@@ -1101,8 +1101,8 @@
           <a:lstStyle/>
           <a:p>
             <a:r>
-              <a:rPr lang="fr-FR"/>
-              <a:t>Modifiez le style du titre</a:t>
+              <a:rPr lang="en-US"/>
+              <a:t>Click to edit Master title style</a:t>
             </a:r>
             <a:endParaRPr lang="en-US" dirty="0"/>
           </a:p>
@@ -1120,8 +1120,8 @@
         </p:nvSpPr>
         <p:spPr>
           <a:xfrm>
-            <a:off x="471488" y="1916484"/>
-            <a:ext cx="2914650" cy="4567898"/>
+            <a:off x="471488" y="3245556"/>
+            <a:ext cx="2914650" cy="7735712"/>
           </a:xfrm>
         </p:spPr>
         <p:txBody>
@@ -1130,36 +1130,36 @@
           <a:p>
             <a:pPr lvl="0"/>
             <a:r>
-              <a:rPr lang="fr-FR"/>
-              <a:t>Cliquez pour modifier les styles du texte du masque</a:t>
+              <a:rPr lang="en-US"/>
+              <a:t>Click to edit Master text styles</a:t>
             </a:r>
           </a:p>
           <a:p>
             <a:pPr lvl="1"/>
             <a:r>
-              <a:rPr lang="fr-FR"/>
-              <a:t>Deuxième niveau</a:t>
+              <a:rPr lang="en-US"/>
+              <a:t>Second level</a:t>
             </a:r>
           </a:p>
           <a:p>
             <a:pPr lvl="2"/>
             <a:r>
-              <a:rPr lang="fr-FR"/>
-              <a:t>Troisième niveau</a:t>
+              <a:rPr lang="en-US"/>
+              <a:t>Third level</a:t>
             </a:r>
           </a:p>
           <a:p>
             <a:pPr lvl="3"/>
             <a:r>
-              <a:rPr lang="fr-FR"/>
-              <a:t>Quatrième niveau</a:t>
+              <a:rPr lang="en-US"/>
+              <a:t>Fourth level</a:t>
             </a:r>
           </a:p>
           <a:p>
             <a:pPr lvl="4"/>
             <a:r>
-              <a:rPr lang="fr-FR"/>
-              <a:t>Cinquième niveau</a:t>
+              <a:rPr lang="en-US"/>
+              <a:t>Fifth level</a:t>
             </a:r>
             <a:endParaRPr lang="en-US" dirty="0"/>
           </a:p>
@@ -1177,8 +1177,8 @@
         </p:nvSpPr>
         <p:spPr>
           <a:xfrm>
-            <a:off x="3471863" y="1916484"/>
-            <a:ext cx="2914650" cy="4567898"/>
+            <a:off x="3471863" y="3245556"/>
+            <a:ext cx="2914650" cy="7735712"/>
           </a:xfrm>
         </p:spPr>
         <p:txBody>
@@ -1187,36 +1187,36 @@
           <a:p>
             <a:pPr lvl="0"/>
             <a:r>
-              <a:rPr lang="fr-FR"/>
-              <a:t>Cliquez pour modifier les styles du texte du masque</a:t>
+              <a:rPr lang="en-US"/>
+              <a:t>Click to edit Master text styles</a:t>
             </a:r>
           </a:p>
           <a:p>
             <a:pPr lvl="1"/>
             <a:r>
-              <a:rPr lang="fr-FR"/>
-              <a:t>Deuxième niveau</a:t>
+              <a:rPr lang="en-US"/>
+              <a:t>Second level</a:t>
             </a:r>
           </a:p>
           <a:p>
             <a:pPr lvl="2"/>
             <a:r>
-              <a:rPr lang="fr-FR"/>
-              <a:t>Troisième niveau</a:t>
+              <a:rPr lang="en-US"/>
+              <a:t>Third level</a:t>
             </a:r>
           </a:p>
           <a:p>
             <a:pPr lvl="3"/>
             <a:r>
-              <a:rPr lang="fr-FR"/>
-              <a:t>Quatrième niveau</a:t>
+              <a:rPr lang="en-US"/>
+              <a:t>Fourth level</a:t>
             </a:r>
           </a:p>
           <a:p>
             <a:pPr lvl="4"/>
             <a:r>
-              <a:rPr lang="fr-FR"/>
-              <a:t>Cinquième niveau</a:t>
+              <a:rPr lang="en-US"/>
+              <a:t>Fifth level</a:t>
             </a:r>
             <a:endParaRPr lang="en-US" dirty="0"/>
           </a:p>
@@ -1239,7 +1239,7 @@
           <a:p>
             <a:fld id="{AE838A5E-F36F-4AC1-9778-6D8D7F5D5B8B}" type="datetimeFigureOut">
               <a:rPr lang="fr-FR" smtClean="0"/>
-              <a:t>20/07/2022</a:t>
+              <a:t>26/08/2022</a:t>
             </a:fld>
             <a:endParaRPr lang="fr-FR"/>
           </a:p>
@@ -1281,7 +1281,7 @@
           <a:p>
             <a:fld id="{8A2DA0C8-2C0F-40CF-8DDA-C2B273B090D3}" type="slidenum">
               <a:rPr lang="fr-FR" smtClean="0"/>
-              <a:t>‹N°›</a:t>
+              <a:t>‹#›</a:t>
             </a:fld>
             <a:endParaRPr lang="fr-FR"/>
           </a:p>
@@ -1290,7 +1290,7 @@
     </p:spTree>
     <p:extLst>
       <p:ext uri="{BB962C8B-B14F-4D97-AF65-F5344CB8AC3E}">
-        <p14:creationId xmlns:p14="http://schemas.microsoft.com/office/powerpoint/2010/main" val="3255030121"/>
+        <p14:creationId xmlns:p14="http://schemas.microsoft.com/office/powerpoint/2010/main" val="2373639018"/>
       </p:ext>
     </p:extLst>
   </p:cSld>
@@ -1302,7 +1302,7 @@
 
 <file path=ppt/slideLayouts/slideLayout5.xml><?xml version="1.0" encoding="utf-8"?>
 <p:sldLayout xmlns:a="http://schemas.openxmlformats.org/drawingml/2006/main" xmlns:r="http://schemas.openxmlformats.org/officeDocument/2006/relationships" xmlns:p="http://schemas.openxmlformats.org/presentationml/2006/main" type="twoTxTwoObj" preserve="1">
-  <p:cSld name="Comparaison">
+  <p:cSld name="Comparison">
     <p:spTree>
       <p:nvGrpSpPr>
         <p:cNvPr id="1" name=""/>
@@ -1329,17 +1329,17 @@
         </p:nvSpPr>
         <p:spPr>
           <a:xfrm>
-            <a:off x="472381" y="383299"/>
-            <a:ext cx="5915025" cy="1391534"/>
-          </a:xfrm>
-        </p:spPr>
-        <p:txBody>
-          <a:bodyPr/>
-          <a:lstStyle/>
-          <a:p>
-            <a:r>
-              <a:rPr lang="fr-FR"/>
-              <a:t>Modifiez le style du titre</a:t>
+            <a:off x="472381" y="649114"/>
+            <a:ext cx="5915025" cy="2356556"/>
+          </a:xfrm>
+        </p:spPr>
+        <p:txBody>
+          <a:bodyPr/>
+          <a:lstStyle/>
+          <a:p>
+            <a:r>
+              <a:rPr lang="en-US"/>
+              <a:t>Click to edit Master title style</a:t>
             </a:r>
             <a:endParaRPr lang="en-US" dirty="0"/>
           </a:p>
@@ -1357,8 +1357,8 @@
         </p:nvSpPr>
         <p:spPr>
           <a:xfrm>
-            <a:off x="472381" y="1764832"/>
-            <a:ext cx="2901255" cy="864917"/>
+            <a:off x="472381" y="2988734"/>
+            <a:ext cx="2901255" cy="1464732"/>
           </a:xfrm>
         </p:spPr>
         <p:txBody>
@@ -1404,8 +1404,8 @@
           <a:p>
             <a:pPr lvl="0"/>
             <a:r>
-              <a:rPr lang="fr-FR"/>
-              <a:t>Cliquez pour modifier les styles du texte du masque</a:t>
+              <a:rPr lang="en-US"/>
+              <a:t>Click to edit Master text styles</a:t>
             </a:r>
           </a:p>
         </p:txBody>
@@ -1422,8 +1422,8 @@
         </p:nvSpPr>
         <p:spPr>
           <a:xfrm>
-            <a:off x="472381" y="2629749"/>
-            <a:ext cx="2901255" cy="3867965"/>
+            <a:off x="472381" y="4453467"/>
+            <a:ext cx="2901255" cy="6550379"/>
           </a:xfrm>
         </p:spPr>
         <p:txBody>
@@ -1432,36 +1432,36 @@
           <a:p>
             <a:pPr lvl="0"/>
             <a:r>
-              <a:rPr lang="fr-FR"/>
-              <a:t>Cliquez pour modifier les styles du texte du masque</a:t>
+              <a:rPr lang="en-US"/>
+              <a:t>Click to edit Master text styles</a:t>
             </a:r>
           </a:p>
           <a:p>
             <a:pPr lvl="1"/>
             <a:r>
-              <a:rPr lang="fr-FR"/>
-              <a:t>Deuxième niveau</a:t>
+              <a:rPr lang="en-US"/>
+              <a:t>Second level</a:t>
             </a:r>
           </a:p>
           <a:p>
             <a:pPr lvl="2"/>
             <a:r>
-              <a:rPr lang="fr-FR"/>
-              <a:t>Troisième niveau</a:t>
+              <a:rPr lang="en-US"/>
+              <a:t>Third level</a:t>
             </a:r>
           </a:p>
           <a:p>
             <a:pPr lvl="3"/>
             <a:r>
-              <a:rPr lang="fr-FR"/>
-              <a:t>Quatrième niveau</a:t>
+              <a:rPr lang="en-US"/>
+              <a:t>Fourth level</a:t>
             </a:r>
           </a:p>
           <a:p>
             <a:pPr lvl="4"/>
             <a:r>
-              <a:rPr lang="fr-FR"/>
-              <a:t>Cinquième niveau</a:t>
+              <a:rPr lang="en-US"/>
+              <a:t>Fifth level</a:t>
             </a:r>
             <a:endParaRPr lang="en-US" dirty="0"/>
           </a:p>
@@ -1479,8 +1479,8 @@
         </p:nvSpPr>
         <p:spPr>
           <a:xfrm>
-            <a:off x="3471863" y="1764832"/>
-            <a:ext cx="2915543" cy="864917"/>
+            <a:off x="3471863" y="2988734"/>
+            <a:ext cx="2915543" cy="1464732"/>
           </a:xfrm>
         </p:spPr>
         <p:txBody>
@@ -1526,8 +1526,8 @@
           <a:p>
             <a:pPr lvl="0"/>
             <a:r>
-              <a:rPr lang="fr-FR"/>
-              <a:t>Cliquez pour modifier les styles du texte du masque</a:t>
+              <a:rPr lang="en-US"/>
+              <a:t>Click to edit Master text styles</a:t>
             </a:r>
           </a:p>
         </p:txBody>
@@ -1544,8 +1544,8 @@
         </p:nvSpPr>
         <p:spPr>
           <a:xfrm>
-            <a:off x="3471863" y="2629749"/>
-            <a:ext cx="2915543" cy="3867965"/>
+            <a:off x="3471863" y="4453467"/>
+            <a:ext cx="2915543" cy="6550379"/>
           </a:xfrm>
         </p:spPr>
         <p:txBody>
@@ -1554,36 +1554,36 @@
           <a:p>
             <a:pPr lvl="0"/>
             <a:r>
-              <a:rPr lang="fr-FR"/>
-              <a:t>Cliquez pour modifier les styles du texte du masque</a:t>
+              <a:rPr lang="en-US"/>
+              <a:t>Click to edit Master text styles</a:t>
             </a:r>
           </a:p>
           <a:p>
             <a:pPr lvl="1"/>
             <a:r>
-              <a:rPr lang="fr-FR"/>
-              <a:t>Deuxième niveau</a:t>
+              <a:rPr lang="en-US"/>
+              <a:t>Second level</a:t>
             </a:r>
           </a:p>
           <a:p>
             <a:pPr lvl="2"/>
             <a:r>
-              <a:rPr lang="fr-FR"/>
-              <a:t>Troisième niveau</a:t>
+              <a:rPr lang="en-US"/>
+              <a:t>Third level</a:t>
             </a:r>
           </a:p>
           <a:p>
             <a:pPr lvl="3"/>
             <a:r>
-              <a:rPr lang="fr-FR"/>
-              <a:t>Quatrième niveau</a:t>
+              <a:rPr lang="en-US"/>
+              <a:t>Fourth level</a:t>
             </a:r>
           </a:p>
           <a:p>
             <a:pPr lvl="4"/>
             <a:r>
-              <a:rPr lang="fr-FR"/>
-              <a:t>Cinquième niveau</a:t>
+              <a:rPr lang="en-US"/>
+              <a:t>Fifth level</a:t>
             </a:r>
             <a:endParaRPr lang="en-US" dirty="0"/>
           </a:p>
@@ -1606,7 +1606,7 @@
           <a:p>
             <a:fld id="{AE838A5E-F36F-4AC1-9778-6D8D7F5D5B8B}" type="datetimeFigureOut">
               <a:rPr lang="fr-FR" smtClean="0"/>
-              <a:t>20/07/2022</a:t>
+              <a:t>26/08/2022</a:t>
             </a:fld>
             <a:endParaRPr lang="fr-FR"/>
           </a:p>
@@ -1648,7 +1648,7 @@
           <a:p>
             <a:fld id="{8A2DA0C8-2C0F-40CF-8DDA-C2B273B090D3}" type="slidenum">
               <a:rPr lang="fr-FR" smtClean="0"/>
-              <a:t>‹N°›</a:t>
+              <a:t>‹#›</a:t>
             </a:fld>
             <a:endParaRPr lang="fr-FR"/>
           </a:p>
@@ -1657,7 +1657,7 @@
     </p:spTree>
     <p:extLst>
       <p:ext uri="{BB962C8B-B14F-4D97-AF65-F5344CB8AC3E}">
-        <p14:creationId xmlns:p14="http://schemas.microsoft.com/office/powerpoint/2010/main" val="1097951056"/>
+        <p14:creationId xmlns:p14="http://schemas.microsoft.com/office/powerpoint/2010/main" val="2694030279"/>
       </p:ext>
     </p:extLst>
   </p:cSld>
@@ -1669,7 +1669,7 @@
 
 <file path=ppt/slideLayouts/slideLayout6.xml><?xml version="1.0" encoding="utf-8"?>
 <p:sldLayout xmlns:a="http://schemas.openxmlformats.org/drawingml/2006/main" xmlns:r="http://schemas.openxmlformats.org/officeDocument/2006/relationships" xmlns:p="http://schemas.openxmlformats.org/presentationml/2006/main" type="titleOnly" preserve="1">
-  <p:cSld name="Titre seul">
+  <p:cSld name="Title Only">
     <p:spTree>
       <p:nvGrpSpPr>
         <p:cNvPr id="1" name=""/>
@@ -1700,8 +1700,8 @@
           <a:lstStyle/>
           <a:p>
             <a:r>
-              <a:rPr lang="fr-FR"/>
-              <a:t>Modifiez le style du titre</a:t>
+              <a:rPr lang="en-US"/>
+              <a:t>Click to edit Master title style</a:t>
             </a:r>
             <a:endParaRPr lang="en-US" dirty="0"/>
           </a:p>
@@ -1724,7 +1724,7 @@
           <a:p>
             <a:fld id="{AE838A5E-F36F-4AC1-9778-6D8D7F5D5B8B}" type="datetimeFigureOut">
               <a:rPr lang="fr-FR" smtClean="0"/>
-              <a:t>20/07/2022</a:t>
+              <a:t>26/08/2022</a:t>
             </a:fld>
             <a:endParaRPr lang="fr-FR"/>
           </a:p>
@@ -1766,7 +1766,7 @@
           <a:p>
             <a:fld id="{8A2DA0C8-2C0F-40CF-8DDA-C2B273B090D3}" type="slidenum">
               <a:rPr lang="fr-FR" smtClean="0"/>
-              <a:t>‹N°›</a:t>
+              <a:t>‹#›</a:t>
             </a:fld>
             <a:endParaRPr lang="fr-FR"/>
           </a:p>
@@ -1775,7 +1775,7 @@
     </p:spTree>
     <p:extLst>
       <p:ext uri="{BB962C8B-B14F-4D97-AF65-F5344CB8AC3E}">
-        <p14:creationId xmlns:p14="http://schemas.microsoft.com/office/powerpoint/2010/main" val="2573319096"/>
+        <p14:creationId xmlns:p14="http://schemas.microsoft.com/office/powerpoint/2010/main" val="1405114000"/>
       </p:ext>
     </p:extLst>
   </p:cSld>
@@ -1787,7 +1787,7 @@
 
 <file path=ppt/slideLayouts/slideLayout7.xml><?xml version="1.0" encoding="utf-8"?>
 <p:sldLayout xmlns:a="http://schemas.openxmlformats.org/drawingml/2006/main" xmlns:r="http://schemas.openxmlformats.org/officeDocument/2006/relationships" xmlns:p="http://schemas.openxmlformats.org/presentationml/2006/main" type="blank" preserve="1">
-  <p:cSld name="Vide">
+  <p:cSld name="Blank">
     <p:spTree>
       <p:nvGrpSpPr>
         <p:cNvPr id="1" name=""/>
@@ -1819,7 +1819,7 @@
           <a:p>
             <a:fld id="{AE838A5E-F36F-4AC1-9778-6D8D7F5D5B8B}" type="datetimeFigureOut">
               <a:rPr lang="fr-FR" smtClean="0"/>
-              <a:t>20/07/2022</a:t>
+              <a:t>26/08/2022</a:t>
             </a:fld>
             <a:endParaRPr lang="fr-FR"/>
           </a:p>
@@ -1861,7 +1861,7 @@
           <a:p>
             <a:fld id="{8A2DA0C8-2C0F-40CF-8DDA-C2B273B090D3}" type="slidenum">
               <a:rPr lang="fr-FR" smtClean="0"/>
-              <a:t>‹N°›</a:t>
+              <a:t>‹#›</a:t>
             </a:fld>
             <a:endParaRPr lang="fr-FR"/>
           </a:p>
@@ -1870,7 +1870,7 @@
     </p:spTree>
     <p:extLst>
       <p:ext uri="{BB962C8B-B14F-4D97-AF65-F5344CB8AC3E}">
-        <p14:creationId xmlns:p14="http://schemas.microsoft.com/office/powerpoint/2010/main" val="1021413506"/>
+        <p14:creationId xmlns:p14="http://schemas.microsoft.com/office/powerpoint/2010/main" val="3574840461"/>
       </p:ext>
     </p:extLst>
   </p:cSld>
@@ -1882,7 +1882,7 @@
 
 <file path=ppt/slideLayouts/slideLayout8.xml><?xml version="1.0" encoding="utf-8"?>
 <p:sldLayout xmlns:a="http://schemas.openxmlformats.org/drawingml/2006/main" xmlns:r="http://schemas.openxmlformats.org/officeDocument/2006/relationships" xmlns:p="http://schemas.openxmlformats.org/presentationml/2006/main" type="objTx" preserve="1">
-  <p:cSld name="Contenu avec légende">
+  <p:cSld name="Content with Caption">
     <p:spTree>
       <p:nvGrpSpPr>
         <p:cNvPr id="1" name=""/>
@@ -1909,8 +1909,8 @@
         </p:nvSpPr>
         <p:spPr>
           <a:xfrm>
-            <a:off x="472381" y="479954"/>
-            <a:ext cx="2211884" cy="1679840"/>
+            <a:off x="472381" y="812800"/>
+            <a:ext cx="2211884" cy="2844800"/>
           </a:xfrm>
         </p:spPr>
         <p:txBody>
@@ -1922,8 +1922,8 @@
           </a:lstStyle>
           <a:p>
             <a:r>
-              <a:rPr lang="fr-FR"/>
-              <a:t>Modifiez le style du titre</a:t>
+              <a:rPr lang="en-US"/>
+              <a:t>Click to edit Master title style</a:t>
             </a:r>
             <a:endParaRPr lang="en-US" dirty="0"/>
           </a:p>
@@ -1941,8 +1941,8 @@
         </p:nvSpPr>
         <p:spPr>
           <a:xfrm>
-            <a:off x="2915543" y="1036570"/>
-            <a:ext cx="3471863" cy="5116178"/>
+            <a:off x="2915543" y="1755425"/>
+            <a:ext cx="3471863" cy="8664222"/>
           </a:xfrm>
         </p:spPr>
         <p:txBody>
@@ -1979,36 +1979,36 @@
           <a:p>
             <a:pPr lvl="0"/>
             <a:r>
-              <a:rPr lang="fr-FR"/>
-              <a:t>Cliquez pour modifier les styles du texte du masque</a:t>
+              <a:rPr lang="en-US"/>
+              <a:t>Click to edit Master text styles</a:t>
             </a:r>
           </a:p>
           <a:p>
             <a:pPr lvl="1"/>
             <a:r>
-              <a:rPr lang="fr-FR"/>
-              <a:t>Deuxième niveau</a:t>
+              <a:rPr lang="en-US"/>
+              <a:t>Second level</a:t>
             </a:r>
           </a:p>
           <a:p>
             <a:pPr lvl="2"/>
             <a:r>
-              <a:rPr lang="fr-FR"/>
-              <a:t>Troisième niveau</a:t>
+              <a:rPr lang="en-US"/>
+              <a:t>Third level</a:t>
             </a:r>
           </a:p>
           <a:p>
             <a:pPr lvl="3"/>
             <a:r>
-              <a:rPr lang="fr-FR"/>
-              <a:t>Quatrième niveau</a:t>
+              <a:rPr lang="en-US"/>
+              <a:t>Fourth level</a:t>
             </a:r>
           </a:p>
           <a:p>
             <a:pPr lvl="4"/>
             <a:r>
-              <a:rPr lang="fr-FR"/>
-              <a:t>Cinquième niveau</a:t>
+              <a:rPr lang="en-US"/>
+              <a:t>Fifth level</a:t>
             </a:r>
             <a:endParaRPr lang="en-US" dirty="0"/>
           </a:p>
@@ -2026,8 +2026,8 @@
         </p:nvSpPr>
         <p:spPr>
           <a:xfrm>
-            <a:off x="472381" y="2159794"/>
-            <a:ext cx="2211884" cy="4001285"/>
+            <a:off x="472381" y="3657600"/>
+            <a:ext cx="2211884" cy="6776156"/>
           </a:xfrm>
         </p:spPr>
         <p:txBody>
@@ -2073,8 +2073,8 @@
           <a:p>
             <a:pPr lvl="0"/>
             <a:r>
-              <a:rPr lang="fr-FR"/>
-              <a:t>Cliquez pour modifier les styles du texte du masque</a:t>
+              <a:rPr lang="en-US"/>
+              <a:t>Click to edit Master text styles</a:t>
             </a:r>
           </a:p>
         </p:txBody>
@@ -2096,7 +2096,7 @@
           <a:p>
             <a:fld id="{AE838A5E-F36F-4AC1-9778-6D8D7F5D5B8B}" type="datetimeFigureOut">
               <a:rPr lang="fr-FR" smtClean="0"/>
-              <a:t>20/07/2022</a:t>
+              <a:t>26/08/2022</a:t>
             </a:fld>
             <a:endParaRPr lang="fr-FR"/>
           </a:p>
@@ -2138,7 +2138,7 @@
           <a:p>
             <a:fld id="{8A2DA0C8-2C0F-40CF-8DDA-C2B273B090D3}" type="slidenum">
               <a:rPr lang="fr-FR" smtClean="0"/>
-              <a:t>‹N°›</a:t>
+              <a:t>‹#›</a:t>
             </a:fld>
             <a:endParaRPr lang="fr-FR"/>
           </a:p>
@@ -2147,7 +2147,7 @@
     </p:spTree>
     <p:extLst>
       <p:ext uri="{BB962C8B-B14F-4D97-AF65-F5344CB8AC3E}">
-        <p14:creationId xmlns:p14="http://schemas.microsoft.com/office/powerpoint/2010/main" val="3801751567"/>
+        <p14:creationId xmlns:p14="http://schemas.microsoft.com/office/powerpoint/2010/main" val="3752023562"/>
       </p:ext>
     </p:extLst>
   </p:cSld>
@@ -2159,7 +2159,7 @@
 
 <file path=ppt/slideLayouts/slideLayout9.xml><?xml version="1.0" encoding="utf-8"?>
 <p:sldLayout xmlns:a="http://schemas.openxmlformats.org/drawingml/2006/main" xmlns:r="http://schemas.openxmlformats.org/officeDocument/2006/relationships" xmlns:p="http://schemas.openxmlformats.org/presentationml/2006/main" type="picTx" preserve="1">
-  <p:cSld name="Image avec légende">
+  <p:cSld name="Picture with Caption">
     <p:spTree>
       <p:nvGrpSpPr>
         <p:cNvPr id="1" name=""/>
@@ -2186,8 +2186,8 @@
         </p:nvSpPr>
         <p:spPr>
           <a:xfrm>
-            <a:off x="472381" y="479954"/>
-            <a:ext cx="2211884" cy="1679840"/>
+            <a:off x="472381" y="812800"/>
+            <a:ext cx="2211884" cy="2844800"/>
           </a:xfrm>
         </p:spPr>
         <p:txBody>
@@ -2199,8 +2199,8 @@
           </a:lstStyle>
           <a:p>
             <a:r>
-              <a:rPr lang="fr-FR"/>
-              <a:t>Modifiez le style du titre</a:t>
+              <a:rPr lang="en-US"/>
+              <a:t>Click to edit Master title style</a:t>
             </a:r>
             <a:endParaRPr lang="en-US" dirty="0"/>
           </a:p>
@@ -2218,8 +2218,8 @@
         </p:nvSpPr>
         <p:spPr>
           <a:xfrm>
-            <a:off x="2915543" y="1036570"/>
-            <a:ext cx="3471863" cy="5116178"/>
+            <a:off x="2915543" y="1755425"/>
+            <a:ext cx="3471863" cy="8664222"/>
           </a:xfrm>
         </p:spPr>
         <p:txBody>
@@ -2264,8 +2264,8 @@
           </a:lstStyle>
           <a:p>
             <a:r>
-              <a:rPr lang="fr-FR"/>
-              <a:t>Cliquez sur l'icône pour ajouter une image</a:t>
+              <a:rPr lang="en-US"/>
+              <a:t>Click icon to add picture</a:t>
             </a:r>
             <a:endParaRPr lang="en-US" dirty="0"/>
           </a:p>
@@ -2283,8 +2283,8 @@
         </p:nvSpPr>
         <p:spPr>
           <a:xfrm>
-            <a:off x="472381" y="2159794"/>
-            <a:ext cx="2211884" cy="4001285"/>
+            <a:off x="472381" y="3657600"/>
+            <a:ext cx="2211884" cy="6776156"/>
           </a:xfrm>
         </p:spPr>
         <p:txBody>
@@ -2330,8 +2330,8 @@
           <a:p>
             <a:pPr lvl="0"/>
             <a:r>
-              <a:rPr lang="fr-FR"/>
-              <a:t>Cliquez pour modifier les styles du texte du masque</a:t>
+              <a:rPr lang="en-US"/>
+              <a:t>Click to edit Master text styles</a:t>
             </a:r>
           </a:p>
         </p:txBody>
@@ -2353,7 +2353,7 @@
           <a:p>
             <a:fld id="{AE838A5E-F36F-4AC1-9778-6D8D7F5D5B8B}" type="datetimeFigureOut">
               <a:rPr lang="fr-FR" smtClean="0"/>
-              <a:t>20/07/2022</a:t>
+              <a:t>26/08/2022</a:t>
             </a:fld>
             <a:endParaRPr lang="fr-FR"/>
           </a:p>
@@ -2395,7 +2395,7 @@
           <a:p>
             <a:fld id="{8A2DA0C8-2C0F-40CF-8DDA-C2B273B090D3}" type="slidenum">
               <a:rPr lang="fr-FR" smtClean="0"/>
-              <a:t>‹N°›</a:t>
+              <a:t>‹#›</a:t>
             </a:fld>
             <a:endParaRPr lang="fr-FR"/>
           </a:p>
@@ -2404,7 +2404,7 @@
     </p:spTree>
     <p:extLst>
       <p:ext uri="{BB962C8B-B14F-4D97-AF65-F5344CB8AC3E}">
-        <p14:creationId xmlns:p14="http://schemas.microsoft.com/office/powerpoint/2010/main" val="646622819"/>
+        <p14:creationId xmlns:p14="http://schemas.microsoft.com/office/powerpoint/2010/main" val="2523903250"/>
       </p:ext>
     </p:extLst>
   </p:cSld>
@@ -2448,8 +2448,8 @@
         </p:nvSpPr>
         <p:spPr>
           <a:xfrm>
-            <a:off x="471488" y="383299"/>
-            <a:ext cx="5915025" cy="1391534"/>
+            <a:off x="471488" y="649114"/>
+            <a:ext cx="5915025" cy="2356556"/>
           </a:xfrm>
           <a:prstGeom prst="rect">
             <a:avLst/>
@@ -2462,8 +2462,8 @@
           <a:lstStyle/>
           <a:p>
             <a:r>
-              <a:rPr lang="fr-FR"/>
-              <a:t>Modifiez le style du titre</a:t>
+              <a:rPr lang="en-US"/>
+              <a:t>Click to edit Master title style</a:t>
             </a:r>
             <a:endParaRPr lang="en-US" dirty="0"/>
           </a:p>
@@ -2481,8 +2481,8 @@
         </p:nvSpPr>
         <p:spPr>
           <a:xfrm>
-            <a:off x="471488" y="1916484"/>
-            <a:ext cx="5915025" cy="4567898"/>
+            <a:off x="471488" y="3245556"/>
+            <a:ext cx="5915025" cy="7735712"/>
           </a:xfrm>
           <a:prstGeom prst="rect">
             <a:avLst/>
@@ -2496,36 +2496,36 @@
           <a:p>
             <a:pPr lvl="0"/>
             <a:r>
-              <a:rPr lang="fr-FR"/>
-              <a:t>Cliquez pour modifier les styles du texte du masque</a:t>
+              <a:rPr lang="en-US"/>
+              <a:t>Click to edit Master text styles</a:t>
             </a:r>
           </a:p>
           <a:p>
             <a:pPr lvl="1"/>
             <a:r>
-              <a:rPr lang="fr-FR"/>
-              <a:t>Deuxième niveau</a:t>
+              <a:rPr lang="en-US"/>
+              <a:t>Second level</a:t>
             </a:r>
           </a:p>
           <a:p>
             <a:pPr lvl="2"/>
             <a:r>
-              <a:rPr lang="fr-FR"/>
-              <a:t>Troisième niveau</a:t>
+              <a:rPr lang="en-US"/>
+              <a:t>Third level</a:t>
             </a:r>
           </a:p>
           <a:p>
             <a:pPr lvl="3"/>
             <a:r>
-              <a:rPr lang="fr-FR"/>
-              <a:t>Quatrième niveau</a:t>
+              <a:rPr lang="en-US"/>
+              <a:t>Fourth level</a:t>
             </a:r>
           </a:p>
           <a:p>
             <a:pPr lvl="4"/>
             <a:r>
-              <a:rPr lang="fr-FR"/>
-              <a:t>Cinquième niveau</a:t>
+              <a:rPr lang="en-US"/>
+              <a:t>Fifth level</a:t>
             </a:r>
             <a:endParaRPr lang="en-US" dirty="0"/>
           </a:p>
@@ -2543,8 +2543,8 @@
         </p:nvSpPr>
         <p:spPr>
           <a:xfrm>
-            <a:off x="471488" y="6672698"/>
-            <a:ext cx="1543050" cy="383297"/>
+            <a:off x="471488" y="11300181"/>
+            <a:ext cx="1543050" cy="649111"/>
           </a:xfrm>
           <a:prstGeom prst="rect">
             <a:avLst/>
@@ -2566,7 +2566,7 @@
           <a:p>
             <a:fld id="{AE838A5E-F36F-4AC1-9778-6D8D7F5D5B8B}" type="datetimeFigureOut">
               <a:rPr lang="fr-FR" smtClean="0"/>
-              <a:t>20/07/2022</a:t>
+              <a:t>26/08/2022</a:t>
             </a:fld>
             <a:endParaRPr lang="fr-FR"/>
           </a:p>
@@ -2584,8 +2584,8 @@
         </p:nvSpPr>
         <p:spPr>
           <a:xfrm>
-            <a:off x="2271713" y="6672698"/>
-            <a:ext cx="2314575" cy="383297"/>
+            <a:off x="2271713" y="11300181"/>
+            <a:ext cx="2314575" cy="649111"/>
           </a:xfrm>
           <a:prstGeom prst="rect">
             <a:avLst/>
@@ -2621,8 +2621,8 @@
         </p:nvSpPr>
         <p:spPr>
           <a:xfrm>
-            <a:off x="4843463" y="6672698"/>
-            <a:ext cx="1543050" cy="383297"/>
+            <a:off x="4843463" y="11300181"/>
+            <a:ext cx="1543050" cy="649111"/>
           </a:xfrm>
           <a:prstGeom prst="rect">
             <a:avLst/>
@@ -2644,7 +2644,7 @@
           <a:p>
             <a:fld id="{8A2DA0C8-2C0F-40CF-8DDA-C2B273B090D3}" type="slidenum">
               <a:rPr lang="fr-FR" smtClean="0"/>
-              <a:t>‹N°›</a:t>
+              <a:t>‹#›</a:t>
             </a:fld>
             <a:endParaRPr lang="fr-FR"/>
           </a:p>
@@ -2653,23 +2653,23 @@
     </p:spTree>
     <p:extLst>
       <p:ext uri="{BB962C8B-B14F-4D97-AF65-F5344CB8AC3E}">
-        <p14:creationId xmlns:p14="http://schemas.microsoft.com/office/powerpoint/2010/main" val="1762935845"/>
+        <p14:creationId xmlns:p14="http://schemas.microsoft.com/office/powerpoint/2010/main" val="2373039436"/>
       </p:ext>
     </p:extLst>
   </p:cSld>
   <p:clrMap bg1="lt1" tx1="dk1" bg2="lt2" tx2="dk2" accent1="accent1" accent2="accent2" accent3="accent3" accent4="accent4" accent5="accent5" accent6="accent6" hlink="hlink" folHlink="folHlink"/>
   <p:sldLayoutIdLst>
-    <p:sldLayoutId id="2147483685" r:id="rId1"/>
-    <p:sldLayoutId id="2147483686" r:id="rId2"/>
-    <p:sldLayoutId id="2147483687" r:id="rId3"/>
-    <p:sldLayoutId id="2147483688" r:id="rId4"/>
-    <p:sldLayoutId id="2147483689" r:id="rId5"/>
-    <p:sldLayoutId id="2147483690" r:id="rId6"/>
-    <p:sldLayoutId id="2147483691" r:id="rId7"/>
-    <p:sldLayoutId id="2147483692" r:id="rId8"/>
-    <p:sldLayoutId id="2147483693" r:id="rId9"/>
-    <p:sldLayoutId id="2147483694" r:id="rId10"/>
-    <p:sldLayoutId id="2147483695" r:id="rId11"/>
+    <p:sldLayoutId id="2147483661" r:id="rId1"/>
+    <p:sldLayoutId id="2147483662" r:id="rId2"/>
+    <p:sldLayoutId id="2147483663" r:id="rId3"/>
+    <p:sldLayoutId id="2147483664" r:id="rId4"/>
+    <p:sldLayoutId id="2147483665" r:id="rId5"/>
+    <p:sldLayoutId id="2147483666" r:id="rId6"/>
+    <p:sldLayoutId id="2147483667" r:id="rId7"/>
+    <p:sldLayoutId id="2147483668" r:id="rId8"/>
+    <p:sldLayoutId id="2147483669" r:id="rId9"/>
+    <p:sldLayoutId id="2147483670" r:id="rId10"/>
+    <p:sldLayoutId id="2147483671" r:id="rId11"/>
   </p:sldLayoutIdLst>
   <p:txStyles>
     <p:titleStyle>
@@ -2985,8 +2985,8 @@
         </p:nvSpPr>
         <p:spPr>
           <a:xfrm>
-            <a:off x="470991" y="636560"/>
-            <a:ext cx="1890000" cy="2671201"/>
+            <a:off x="442127" y="1396721"/>
+            <a:ext cx="1890000" cy="2671200"/>
           </a:xfrm>
           <a:prstGeom prst="rect">
             <a:avLst/>
@@ -3037,8 +3037,8 @@
         </p:nvSpPr>
         <p:spPr>
           <a:xfrm>
-            <a:off x="2582818" y="636560"/>
-            <a:ext cx="1890000" cy="2671201"/>
+            <a:off x="2553955" y="1396721"/>
+            <a:ext cx="1890000" cy="2671200"/>
           </a:xfrm>
           <a:prstGeom prst="rect">
             <a:avLst/>
@@ -3089,8 +3089,8 @@
         </p:nvSpPr>
         <p:spPr>
           <a:xfrm>
-            <a:off x="4688027" y="636560"/>
-            <a:ext cx="1890000" cy="2671201"/>
+            <a:off x="4659162" y="1396721"/>
+            <a:ext cx="1890000" cy="2671200"/>
           </a:xfrm>
           <a:prstGeom prst="rect">
             <a:avLst/>
@@ -3141,8 +3141,8 @@
         </p:nvSpPr>
         <p:spPr>
           <a:xfrm>
-            <a:off x="483709" y="3525036"/>
-            <a:ext cx="1890000" cy="2671201"/>
+            <a:off x="454845" y="4285195"/>
+            <a:ext cx="1890000" cy="2671200"/>
           </a:xfrm>
           <a:prstGeom prst="rect">
             <a:avLst/>
@@ -3193,8 +3193,8 @@
         </p:nvSpPr>
         <p:spPr>
           <a:xfrm>
-            <a:off x="2582818" y="3501256"/>
-            <a:ext cx="1890000" cy="2671201"/>
+            <a:off x="2553955" y="4261414"/>
+            <a:ext cx="1890000" cy="2671200"/>
           </a:xfrm>
           <a:prstGeom prst="rect">
             <a:avLst/>
@@ -3245,8 +3245,8 @@
         </p:nvSpPr>
         <p:spPr>
           <a:xfrm>
-            <a:off x="470991" y="1514866"/>
-            <a:ext cx="1364348" cy="1385892"/>
+            <a:off x="442127" y="2275026"/>
+            <a:ext cx="1364348" cy="1384995"/>
           </a:xfrm>
           <a:prstGeom prst="rect">
             <a:avLst/>
@@ -3260,43 +3260,43 @@
           <a:lstStyle/>
           <a:p>
             <a:r>
-              <a:rPr lang="en-US" sz="1201" b="1" dirty="0"/>
+              <a:rPr lang="en-US" sz="1200" b="1" dirty="0"/>
               <a:t>Introduction</a:t>
             </a:r>
           </a:p>
           <a:p>
             <a:r>
-              <a:rPr lang="en-US" sz="1201" dirty="0"/>
+              <a:rPr lang="en-US" sz="1200" dirty="0"/>
               <a:t>   - Podo</a:t>
             </a:r>
           </a:p>
           <a:p>
             <a:r>
-              <a:rPr lang="en-US" sz="1201" dirty="0"/>
+              <a:rPr lang="en-US" sz="1200" dirty="0"/>
               <a:t>   - ChIP</a:t>
             </a:r>
           </a:p>
           <a:p>
             <a:r>
-              <a:rPr lang="en-US" sz="1201" dirty="0"/>
+              <a:rPr lang="en-US" sz="1200" dirty="0"/>
               <a:t>   - Epigenetics</a:t>
             </a:r>
           </a:p>
           <a:p>
             <a:r>
-              <a:rPr lang="en-US" sz="1201" dirty="0"/>
+              <a:rPr lang="en-US" sz="1200" dirty="0"/>
               <a:t>   - …</a:t>
             </a:r>
           </a:p>
           <a:p>
             <a:r>
-              <a:rPr lang="en-US" sz="1201" dirty="0"/>
+              <a:rPr lang="en-US" sz="1200" dirty="0"/>
               <a:t>   - Questions / aim</a:t>
             </a:r>
           </a:p>
           <a:p>
             <a:r>
-              <a:rPr lang="en-US" sz="1201" dirty="0"/>
+              <a:rPr lang="en-US" sz="1200" dirty="0"/>
               <a:t>   - with references</a:t>
             </a:r>
           </a:p>
@@ -3316,8 +3316,8 @@
         </p:nvSpPr>
         <p:spPr>
           <a:xfrm>
-            <a:off x="2582819" y="3514989"/>
-            <a:ext cx="1864564" cy="277127"/>
+            <a:off x="2553955" y="4275147"/>
+            <a:ext cx="1864564" cy="276999"/>
           </a:xfrm>
           <a:prstGeom prst="rect">
             <a:avLst/>
@@ -3331,7 +3331,7 @@
           <a:lstStyle/>
           <a:p>
             <a:r>
-              <a:rPr lang="en-US" sz="1201" b="1" dirty="0"/>
+              <a:rPr lang="en-US" sz="1200" b="1" dirty="0"/>
               <a:t>Discussion</a:t>
             </a:r>
           </a:p>
@@ -3351,7 +3351,7 @@
         </p:nvCxnSpPr>
         <p:spPr>
           <a:xfrm>
-            <a:off x="1635794" y="1715831"/>
+            <a:off x="1606930" y="2475993"/>
             <a:ext cx="0" cy="733530"/>
           </a:xfrm>
           <a:prstGeom prst="line">
@@ -3387,8 +3387,8 @@
         </p:nvSpPr>
         <p:spPr>
           <a:xfrm>
-            <a:off x="1610361" y="1715834"/>
-            <a:ext cx="801185" cy="738664"/>
+            <a:off x="1581494" y="2475993"/>
+            <a:ext cx="801184" cy="738664"/>
           </a:xfrm>
           <a:prstGeom prst="rect">
             <a:avLst/>
@@ -3428,8 +3428,8 @@
         </p:nvGrpSpPr>
         <p:grpSpPr>
           <a:xfrm>
-            <a:off x="2733545" y="2668839"/>
-            <a:ext cx="1567998" cy="479808"/>
+            <a:off x="2704681" y="3429000"/>
+            <a:ext cx="1567997" cy="479809"/>
             <a:chOff x="2704681" y="3429000"/>
             <a:chExt cx="1567997" cy="479809"/>
           </a:xfrm>
@@ -3523,8 +3523,8 @@
         </p:nvSpPr>
         <p:spPr>
           <a:xfrm>
-            <a:off x="4688026" y="636562"/>
-            <a:ext cx="1864564" cy="1462965"/>
+            <a:off x="4659162" y="1396721"/>
+            <a:ext cx="1864564" cy="1461939"/>
           </a:xfrm>
           <a:prstGeom prst="rect">
             <a:avLst/>
@@ -3538,42 +3538,42 @@
           <a:lstStyle/>
           <a:p>
             <a:r>
-              <a:rPr lang="en-US" sz="1201" b="1" dirty="0"/>
+              <a:rPr lang="en-US" sz="1200" b="1" dirty="0"/>
               <a:t>Results</a:t>
             </a:r>
           </a:p>
           <a:p>
             <a:r>
-              <a:rPr lang="en-US" sz="1101" b="1" dirty="0"/>
+              <a:rPr lang="en-US" sz="1100" b="1" dirty="0"/>
               <a:t>1- Chromatin Prep results</a:t>
             </a:r>
           </a:p>
           <a:p>
-            <a:endParaRPr lang="en-US" sz="1101" b="1" dirty="0"/>
-          </a:p>
-          <a:p>
-            <a:endParaRPr lang="en-US" sz="1101" b="1" dirty="0"/>
-          </a:p>
-          <a:p>
-            <a:endParaRPr lang="en-US" sz="1101" b="1" dirty="0"/>
-          </a:p>
-          <a:p>
-            <a:endParaRPr lang="en-US" sz="1101" b="1" dirty="0"/>
-          </a:p>
-          <a:p>
-            <a:endParaRPr lang="en-US" sz="1101" b="1" dirty="0"/>
-          </a:p>
-          <a:p>
-            <a:r>
-              <a:rPr lang="en-US" sz="1101" b="1" dirty="0"/>
+            <a:endParaRPr lang="en-US" sz="1100" b="1" dirty="0"/>
+          </a:p>
+          <a:p>
+            <a:endParaRPr lang="en-US" sz="1100" b="1" dirty="0"/>
+          </a:p>
+          <a:p>
+            <a:endParaRPr lang="en-US" sz="1100" b="1" dirty="0"/>
+          </a:p>
+          <a:p>
+            <a:endParaRPr lang="en-US" sz="1100" b="1" dirty="0"/>
+          </a:p>
+          <a:p>
+            <a:endParaRPr lang="en-US" sz="1100" b="1" dirty="0"/>
+          </a:p>
+          <a:p>
+            <a:r>
+              <a:rPr lang="en-US" sz="1100" b="1" dirty="0"/>
               <a:t>2- </a:t>
             </a:r>
             <a:r>
-              <a:rPr lang="en-US" sz="1101" b="1" u="sng" dirty="0"/>
+              <a:rPr lang="en-US" sz="1100" b="1" u="sng" dirty="0"/>
               <a:t>Your</a:t>
             </a:r>
             <a:r>
-              <a:rPr lang="en-US" sz="1101" b="1" dirty="0"/>
+              <a:rPr lang="en-US" sz="1100" b="1" dirty="0"/>
               <a:t> ChIP + qPCR results</a:t>
             </a:r>
           </a:p>
@@ -3593,8 +3593,8 @@
         </p:nvSpPr>
         <p:spPr>
           <a:xfrm>
-            <a:off x="509146" y="4735415"/>
-            <a:ext cx="1864564" cy="1000915"/>
+            <a:off x="480281" y="5495572"/>
+            <a:ext cx="1864564" cy="1000274"/>
           </a:xfrm>
           <a:prstGeom prst="rect">
             <a:avLst/>
@@ -3608,27 +3608,27 @@
           <a:lstStyle/>
           <a:p>
             <a:r>
-              <a:rPr lang="en-US" sz="1101" b="1" dirty="0"/>
+              <a:rPr lang="en-US" sz="1100" b="1" dirty="0"/>
               <a:t>3-  </a:t>
             </a:r>
             <a:r>
-              <a:rPr lang="en-US" sz="1101" b="1" u="sng" dirty="0"/>
+              <a:rPr lang="en-US" sz="1100" b="1" u="sng" dirty="0"/>
               <a:t>Integrated</a:t>
             </a:r>
             <a:r>
-              <a:rPr lang="en-US" sz="1101" b="1" dirty="0"/>
+              <a:rPr lang="en-US" sz="1100" b="1" dirty="0"/>
               <a:t> qPCR results</a:t>
             </a:r>
           </a:p>
           <a:p>
             <a:r>
-              <a:rPr lang="en-US" sz="1201" dirty="0"/>
+              <a:rPr lang="en-US" sz="1200" dirty="0"/>
               <a:t>- Combined results for the antibody your used</a:t>
             </a:r>
           </a:p>
           <a:p>
             <a:r>
-              <a:rPr lang="en-US" sz="1201" dirty="0"/>
+              <a:rPr lang="en-US" sz="1200" dirty="0"/>
               <a:t>- Combined results for the other antibodies</a:t>
             </a:r>
           </a:p>
@@ -3648,8 +3648,8 @@
         </p:nvSpPr>
         <p:spPr>
           <a:xfrm>
-            <a:off x="2595536" y="620344"/>
-            <a:ext cx="1864564" cy="1016304"/>
+            <a:off x="2566673" y="1380505"/>
+            <a:ext cx="1864564" cy="1015663"/>
           </a:xfrm>
           <a:prstGeom prst="rect">
             <a:avLst/>
@@ -3663,13 +3663,13 @@
           <a:lstStyle/>
           <a:p>
             <a:r>
-              <a:rPr lang="en-US" sz="1201" b="1" dirty="0"/>
+              <a:rPr lang="en-US" sz="1200" b="1" dirty="0"/>
               <a:t>Methods</a:t>
             </a:r>
           </a:p>
           <a:p>
             <a:r>
-              <a:rPr lang="en-US" sz="1201" dirty="0"/>
+              <a:rPr lang="en-US" sz="1200" dirty="0"/>
               <a:t>  - yours (deviation from the provided protocol, including the antibody you used)</a:t>
             </a:r>
           </a:p>
@@ -3689,8 +3689,8 @@
         </p:nvSpPr>
         <p:spPr>
           <a:xfrm>
-            <a:off x="2574988" y="4689508"/>
-            <a:ext cx="1897833" cy="1201098"/>
+            <a:off x="2546121" y="5449669"/>
+            <a:ext cx="1897833" cy="1200329"/>
           </a:xfrm>
           <a:prstGeom prst="rect">
             <a:avLst/>
@@ -3704,33 +3704,33 @@
           <a:lstStyle/>
           <a:p>
             <a:r>
-              <a:rPr lang="en-US" sz="1201" b="1" dirty="0"/>
+              <a:rPr lang="en-US" sz="1200" b="1" dirty="0"/>
               <a:t>Conclusion and perspectives</a:t>
             </a:r>
           </a:p>
           <a:p>
             <a:r>
-              <a:rPr lang="en-US" sz="1201" dirty="0"/>
+              <a:rPr lang="en-US" sz="1200" dirty="0"/>
               <a:t>Is your ChIP usable?</a:t>
             </a:r>
           </a:p>
           <a:p>
             <a:r>
-              <a:rPr lang="en-US" sz="1201" dirty="0"/>
+              <a:rPr lang="en-US" sz="1200" dirty="0"/>
               <a:t>Possible improvement</a:t>
             </a:r>
           </a:p>
           <a:p>
             <a:r>
-              <a:rPr lang="en-US" sz="1201" dirty="0"/>
+              <a:rPr lang="en-US" sz="1200" dirty="0"/>
               <a:t>Next </a:t>
             </a:r>
             <a:r>
-              <a:rPr lang="en-US" sz="1201"/>
+              <a:rPr lang="en-US" sz="1200"/>
               <a:t>steps and further </a:t>
             </a:r>
             <a:r>
-              <a:rPr lang="en-US" sz="1201" dirty="0"/>
+              <a:rPr lang="en-US" sz="1200" dirty="0"/>
               <a:t>analysis</a:t>
             </a:r>
           </a:p>
@@ -3750,8 +3750,8 @@
         </p:nvSpPr>
         <p:spPr>
           <a:xfrm>
-            <a:off x="4720083" y="3511304"/>
-            <a:ext cx="1890000" cy="2671201"/>
+            <a:off x="4691219" y="4271462"/>
+            <a:ext cx="1890000" cy="2671200"/>
           </a:xfrm>
           <a:prstGeom prst="rect">
             <a:avLst/>
@@ -3802,8 +3802,8 @@
         </p:nvSpPr>
         <p:spPr>
           <a:xfrm>
-            <a:off x="4720082" y="3525037"/>
-            <a:ext cx="1864564" cy="461921"/>
+            <a:off x="4691219" y="4285195"/>
+            <a:ext cx="1864564" cy="461665"/>
           </a:xfrm>
           <a:prstGeom prst="rect">
             <a:avLst/>
@@ -3817,13 +3817,13 @@
           <a:lstStyle/>
           <a:p>
             <a:r>
-              <a:rPr lang="en-US" sz="1201" b="1" dirty="0"/>
+              <a:rPr lang="en-US" sz="1200" b="1" dirty="0"/>
               <a:t>Bibliography</a:t>
             </a:r>
           </a:p>
           <a:p>
             <a:r>
-              <a:rPr lang="en-US" sz="1201" dirty="0"/>
+              <a:rPr lang="en-US" sz="1200" dirty="0"/>
               <a:t>(max 10)</a:t>
             </a:r>
           </a:p>
@@ -3843,8 +3843,8 @@
         </p:nvSpPr>
         <p:spPr>
           <a:xfrm>
-            <a:off x="71718" y="251012"/>
-            <a:ext cx="5212324" cy="369332"/>
+            <a:off x="42853" y="1011173"/>
+            <a:ext cx="5146858" cy="369332"/>
           </a:xfrm>
           <a:prstGeom prst="rect">
             <a:avLst/>
@@ -3860,6 +3860,99 @@
             <a:r>
               <a:rPr lang="en-US" b="1" dirty="0"/>
               <a:t>Outline of the report of the ChIP practical (WET-LAB)</a:t>
+            </a:r>
+          </a:p>
+        </p:txBody>
+      </p:sp>
+      <p:sp>
+        <p:nvSpPr>
+          <p:cNvPr id="92" name="TextBox 91">
+            <a:extLst>
+              <a:ext uri="{FF2B5EF4-FFF2-40B4-BE49-F238E27FC236}">
+                <a16:creationId xmlns:a16="http://schemas.microsoft.com/office/drawing/2014/main" id="{E9D62167-D805-F943-AE18-B697DE00DC15}"/>
+              </a:ext>
+            </a:extLst>
+          </p:cNvPr>
+          <p:cNvSpPr txBox="1"/>
+          <p:nvPr/>
+        </p:nvSpPr>
+        <p:spPr>
+          <a:xfrm>
+            <a:off x="42853" y="8845101"/>
+            <a:ext cx="4171142" cy="1661993"/>
+          </a:xfrm>
+          <a:prstGeom prst="rect">
+            <a:avLst/>
+          </a:prstGeom>
+          <a:noFill/>
+        </p:spPr>
+        <p:txBody>
+          <a:bodyPr wrap="none" rtlCol="0">
+            <a:spAutoFit/>
+          </a:bodyPr>
+          <a:lstStyle/>
+          <a:p>
+            <a:r>
+              <a:rPr lang="en-US" b="1" dirty="0"/>
+              <a:t>Additional instructions</a:t>
+            </a:r>
+          </a:p>
+          <a:p>
+            <a:r>
+              <a:rPr lang="en-US" sz="1200" dirty="0"/>
+              <a:t>  - one report per two-person team</a:t>
+            </a:r>
+          </a:p>
+          <a:p>
+            <a:r>
+              <a:rPr lang="en-US" sz="1200" dirty="0"/>
+              <a:t>  - English.</a:t>
+            </a:r>
+          </a:p>
+          <a:p>
+            <a:r>
+              <a:rPr lang="en-US" sz="1200" dirty="0"/>
+              <a:t>  - A4 page (21 x 29.7 cm)</a:t>
+            </a:r>
+          </a:p>
+          <a:p>
+            <a:r>
+              <a:rPr lang="en-US" sz="1200" dirty="0"/>
+              <a:t>  - Font for the main text: Arial, 11pt, single-space</a:t>
+            </a:r>
+          </a:p>
+          <a:p>
+            <a:r>
+              <a:rPr lang="en-US" sz="1200" dirty="0"/>
+              <a:t>  - Margin: 2.5cm (1 inch) on left/right/top/bottom</a:t>
+            </a:r>
+          </a:p>
+          <a:p>
+            <a:r>
+              <a:rPr lang="en-US" sz="1200" dirty="0"/>
+              <a:t>  - Figures in the main text. With Legend, axis, units, </a:t>
+            </a:r>
+            <a:r>
+              <a:rPr lang="en-US" sz="1200" dirty="0" err="1"/>
+              <a:t>etc</a:t>
+            </a:r>
+            <a:r>
+              <a:rPr lang="en-US" sz="1200" dirty="0"/>
+              <a:t>…</a:t>
+            </a:r>
+          </a:p>
+          <a:p>
+            <a:r>
+              <a:rPr lang="en-US" sz="1200" dirty="0"/>
+              <a:t>  - Electronic version (not printed). PDF. Deposited on </a:t>
+            </a:r>
+            <a:r>
+              <a:rPr lang="en-US" sz="1200" dirty="0" err="1"/>
+              <a:t>eCampus</a:t>
+            </a:r>
+            <a:r>
+              <a:rPr lang="en-US" sz="1200" dirty="0"/>
+              <a:t>.</a:t>
             </a:r>
           </a:p>
         </p:txBody>
@@ -3878,8 +3971,8 @@
         </p:nvSpPr>
         <p:spPr>
           <a:xfrm>
-            <a:off x="453949" y="643998"/>
-            <a:ext cx="623889" cy="277127"/>
+            <a:off x="425082" y="1404159"/>
+            <a:ext cx="623889" cy="276999"/>
           </a:xfrm>
           <a:prstGeom prst="rect">
             <a:avLst/>
@@ -3893,10 +3986,115 @@
           <a:lstStyle/>
           <a:p>
             <a:r>
-              <a:rPr lang="en-US" sz="1201" b="1" dirty="0"/>
+              <a:rPr lang="en-US" sz="1200" b="1" dirty="0"/>
               <a:t>Names</a:t>
             </a:r>
-            <a:endParaRPr lang="en-US" sz="1201" dirty="0"/>
+            <a:endParaRPr lang="en-US" sz="1200" dirty="0"/>
+          </a:p>
+        </p:txBody>
+      </p:sp>
+      <p:sp>
+        <p:nvSpPr>
+          <p:cNvPr id="23" name="TextBox 22">
+            <a:extLst>
+              <a:ext uri="{FF2B5EF4-FFF2-40B4-BE49-F238E27FC236}">
+                <a16:creationId xmlns:a16="http://schemas.microsoft.com/office/drawing/2014/main" id="{57EB1550-A75E-08F0-AFD3-47B2E4484453}"/>
+              </a:ext>
+            </a:extLst>
+          </p:cNvPr>
+          <p:cNvSpPr txBox="1"/>
+          <p:nvPr/>
+        </p:nvSpPr>
+        <p:spPr>
+          <a:xfrm>
+            <a:off x="0" y="7278687"/>
+            <a:ext cx="5918886" cy="1292662"/>
+          </a:xfrm>
+          <a:prstGeom prst="rect">
+            <a:avLst/>
+          </a:prstGeom>
+          <a:noFill/>
+        </p:spPr>
+        <p:txBody>
+          <a:bodyPr wrap="square" rtlCol="0">
+            <a:spAutoFit/>
+          </a:bodyPr>
+          <a:lstStyle/>
+          <a:p>
+            <a:r>
+              <a:rPr lang="en-US" b="1" dirty="0"/>
+              <a:t>Writing instructions</a:t>
+            </a:r>
+          </a:p>
+          <a:p>
+            <a:r>
+              <a:rPr lang="en-US" sz="1200" dirty="0"/>
+              <a:t>  - Write with your own words</a:t>
+            </a:r>
+            <a:r>
+              <a:rPr lang="en-US" sz="1200"/>
+              <a:t>.  </a:t>
+            </a:r>
+            <a:endParaRPr lang="en-US" sz="1200" dirty="0"/>
+          </a:p>
+          <a:p>
+            <a:r>
+              <a:rPr lang="en-US" sz="1200" dirty="0"/>
+              <a:t>  - Copy-paste (from websites, existing publications, …) is prohibited (plagiarism). </a:t>
+            </a:r>
+          </a:p>
+          <a:p>
+            <a:r>
+              <a:rPr lang="en-US" sz="1200" dirty="0"/>
+              <a:t>  - Cite your sources when needed</a:t>
+            </a:r>
+          </a:p>
+          <a:p>
+            <a:r>
+              <a:rPr lang="en-US" sz="1200" dirty="0"/>
+              <a:t>  - Avoid sprawling sentences. Instead, adopt concise / efficient / precise / scientific writing (as done in publications).</a:t>
+            </a:r>
+          </a:p>
+        </p:txBody>
+      </p:sp>
+      <p:sp>
+        <p:nvSpPr>
+          <p:cNvPr id="24" name="TextBox 23">
+            <a:extLst>
+              <a:ext uri="{FF2B5EF4-FFF2-40B4-BE49-F238E27FC236}">
+                <a16:creationId xmlns:a16="http://schemas.microsoft.com/office/drawing/2014/main" id="{D37F488E-1FB1-5446-23D1-496F349B5C69}"/>
+              </a:ext>
+            </a:extLst>
+          </p:cNvPr>
+          <p:cNvSpPr txBox="1"/>
+          <p:nvPr/>
+        </p:nvSpPr>
+        <p:spPr>
+          <a:xfrm>
+            <a:off x="31228" y="10724779"/>
+            <a:ext cx="4220899" cy="553998"/>
+          </a:xfrm>
+          <a:prstGeom prst="rect">
+            <a:avLst/>
+          </a:prstGeom>
+          <a:noFill/>
+        </p:spPr>
+        <p:txBody>
+          <a:bodyPr wrap="none" rtlCol="0">
+            <a:spAutoFit/>
+          </a:bodyPr>
+          <a:lstStyle/>
+          <a:p>
+            <a:r>
+              <a:rPr lang="en-US" b="1" dirty="0"/>
+              <a:t>Grade</a:t>
+            </a:r>
+          </a:p>
+          <a:p>
+            <a:r>
+              <a:rPr lang="en-US" sz="1200" dirty="0"/>
+              <a:t>  This report accounts for 60% of your grade for the teaching unit</a:t>
+            </a:r>
           </a:p>
         </p:txBody>
       </p:sp>
@@ -3914,8 +4112,8 @@
         </p:nvSpPr>
         <p:spPr>
           <a:xfrm>
-            <a:off x="2129464" y="3062367"/>
-            <a:ext cx="256802" cy="261738"/>
+            <a:off x="2100601" y="3822527"/>
+            <a:ext cx="256802" cy="261610"/>
           </a:xfrm>
           <a:prstGeom prst="rect">
             <a:avLst/>
@@ -3929,7 +4127,7 @@
           <a:lstStyle/>
           <a:p>
             <a:r>
-              <a:rPr lang="en-FR" sz="1101" dirty="0"/>
+              <a:rPr lang="en-FR" sz="1100" dirty="0"/>
               <a:t>1</a:t>
             </a:r>
           </a:p>
@@ -3949,8 +4147,8 @@
         </p:nvSpPr>
         <p:spPr>
           <a:xfrm>
-            <a:off x="4272661" y="3082543"/>
-            <a:ext cx="256802" cy="261738"/>
+            <a:off x="4243797" y="3842704"/>
+            <a:ext cx="256802" cy="261610"/>
           </a:xfrm>
           <a:prstGeom prst="rect">
             <a:avLst/>
@@ -3964,7 +4162,7 @@
           <a:lstStyle/>
           <a:p>
             <a:r>
-              <a:rPr lang="en-FR" sz="1101" dirty="0"/>
+              <a:rPr lang="en-FR" sz="1100" dirty="0"/>
               <a:t>2</a:t>
             </a:r>
           </a:p>
@@ -3984,8 +4182,8 @@
         </p:nvSpPr>
         <p:spPr>
           <a:xfrm>
-            <a:off x="6377374" y="3080685"/>
-            <a:ext cx="256802" cy="261738"/>
+            <a:off x="6348510" y="3840846"/>
+            <a:ext cx="256802" cy="261610"/>
           </a:xfrm>
           <a:prstGeom prst="rect">
             <a:avLst/>
@@ -3999,7 +4197,7 @@
           <a:lstStyle/>
           <a:p>
             <a:r>
-              <a:rPr lang="en-FR" sz="1101" dirty="0"/>
+              <a:rPr lang="en-FR" sz="1100" dirty="0"/>
               <a:t>3</a:t>
             </a:r>
           </a:p>
@@ -4019,8 +4217,8 @@
         </p:nvSpPr>
         <p:spPr>
           <a:xfrm>
-            <a:off x="2179451" y="5977769"/>
-            <a:ext cx="256802" cy="261738"/>
+            <a:off x="2150588" y="6737930"/>
+            <a:ext cx="256802" cy="261610"/>
           </a:xfrm>
           <a:prstGeom prst="rect">
             <a:avLst/>
@@ -4034,7 +4232,7 @@
           <a:lstStyle/>
           <a:p>
             <a:r>
-              <a:rPr lang="en-FR" sz="1101" dirty="0"/>
+              <a:rPr lang="en-FR" sz="1100" dirty="0"/>
               <a:t>4</a:t>
             </a:r>
           </a:p>
@@ -4054,8 +4252,8 @@
         </p:nvSpPr>
         <p:spPr>
           <a:xfrm>
-            <a:off x="4285580" y="5973234"/>
-            <a:ext cx="256802" cy="261738"/>
+            <a:off x="4256716" y="6733395"/>
+            <a:ext cx="256802" cy="261610"/>
           </a:xfrm>
           <a:prstGeom prst="rect">
             <a:avLst/>
@@ -4069,7 +4267,7 @@
           <a:lstStyle/>
           <a:p>
             <a:r>
-              <a:rPr lang="en-FR" sz="1101" dirty="0"/>
+              <a:rPr lang="en-FR" sz="1100" dirty="0"/>
               <a:t>5</a:t>
             </a:r>
           </a:p>
@@ -4089,8 +4287,8 @@
         </p:nvSpPr>
         <p:spPr>
           <a:xfrm>
-            <a:off x="6390292" y="5971376"/>
-            <a:ext cx="256802" cy="261738"/>
+            <a:off x="6361429" y="6731537"/>
+            <a:ext cx="256802" cy="261610"/>
           </a:xfrm>
           <a:prstGeom prst="rect">
             <a:avLst/>
@@ -4104,7 +4302,7 @@
           <a:lstStyle/>
           <a:p>
             <a:r>
-              <a:rPr lang="en-FR" sz="1101" dirty="0"/>
+              <a:rPr lang="en-FR" sz="1100" dirty="0"/>
               <a:t>6</a:t>
             </a:r>
           </a:p>
@@ -4126,7 +4324,7 @@
 <file path=ppt/theme/theme1.xml><?xml version="1.0" encoding="utf-8"?>
 <a:theme xmlns:a="http://schemas.openxmlformats.org/drawingml/2006/main" name="Thème Office">
   <a:themeElements>
-    <a:clrScheme name="Thème Office">
+    <a:clrScheme name="Office Theme">
       <a:dk1>
         <a:sysClr val="windowText" lastClr="000000"/>
       </a:dk1>
@@ -4164,7 +4362,7 @@
         <a:srgbClr val="954F72"/>
       </a:folHlink>
     </a:clrScheme>
-    <a:fontScheme name="Thème Office">
+    <a:fontScheme name="Office Theme">
       <a:majorFont>
         <a:latin typeface="Calibri Light" panose="020F0302020204030204"/>
         <a:ea typeface=""/>
@@ -4236,7 +4434,7 @@
         <a:font script="Geor" typeface="Sylfaen"/>
       </a:minorFont>
     </a:fontScheme>
-    <a:fmtScheme name="Thème Office">
+    <a:fmtScheme name="Office Theme">
       <a:fillStyleLst>
         <a:solidFill>
           <a:schemeClr val="phClr"/>

</xml_diff>